<commit_message>
add and modify the files for RAG trials
</commit_message>
<xml_diff>
--- a/raspberry-pi-report/ラズパイ5でローカルLLMを動かす.pptx
+++ b/raspberry-pi-report/ラズパイ5でローカルLLMを動かす.pptx
@@ -129,6 +129,954 @@
 <file path=ppt/changesInfos/changesInfo1.xml><?xml version="1.0" encoding="utf-8"?>
 <pc:chgInfo xmlns:a="http://schemas.openxmlformats.org/drawingml/2006/main" xmlns:r="http://schemas.openxmlformats.org/officeDocument/2006/relationships" xmlns:ac="http://schemas.microsoft.com/office/drawing/2013/main/command" xmlns:pc="http://schemas.microsoft.com/office/powerpoint/2013/main/command">
   <pc:docChgLst>
+    <pc:chgData name="Yoshiharu Hamaguchi" userId="470e288704938fe9" providerId="LiveId" clId="{46C12E7F-E35C-42BF-B856-810C3AAE2138}"/>
+    <pc:docChg chg="custSel modSld">
+      <pc:chgData name="Yoshiharu Hamaguchi" userId="470e288704938fe9" providerId="LiveId" clId="{46C12E7F-E35C-42BF-B856-810C3AAE2138}" dt="2024-08-17T07:15:42.746" v="129" actId="20577"/>
+      <pc:docMkLst>
+        <pc:docMk/>
+      </pc:docMkLst>
+      <pc:sldChg chg="modSp mod">
+        <pc:chgData name="Yoshiharu Hamaguchi" userId="470e288704938fe9" providerId="LiveId" clId="{46C12E7F-E35C-42BF-B856-810C3AAE2138}" dt="2024-08-17T07:13:46.984" v="43" actId="20577"/>
+        <pc:sldMkLst>
+          <pc:docMk/>
+          <pc:sldMk cId="634982452" sldId="256"/>
+        </pc:sldMkLst>
+        <pc:spChg chg="mod">
+          <ac:chgData name="Yoshiharu Hamaguchi" userId="470e288704938fe9" providerId="LiveId" clId="{46C12E7F-E35C-42BF-B856-810C3AAE2138}" dt="2024-08-17T07:13:17.184" v="10" actId="20577"/>
+          <ac:spMkLst>
+            <pc:docMk/>
+            <pc:sldMk cId="634982452" sldId="256"/>
+            <ac:spMk id="2" creationId="{3F0D190A-A8DB-32F1-0D56-13F6D381B778}"/>
+          </ac:spMkLst>
+        </pc:spChg>
+        <pc:spChg chg="mod">
+          <ac:chgData name="Yoshiharu Hamaguchi" userId="470e288704938fe9" providerId="LiveId" clId="{46C12E7F-E35C-42BF-B856-810C3AAE2138}" dt="2024-08-17T07:13:46.984" v="43" actId="20577"/>
+          <ac:spMkLst>
+            <pc:docMk/>
+            <pc:sldMk cId="634982452" sldId="256"/>
+            <ac:spMk id="3" creationId="{BC817A74-920C-0926-7C76-24BA4993B9F3}"/>
+          </ac:spMkLst>
+        </pc:spChg>
+      </pc:sldChg>
+      <pc:sldChg chg="modSp mod">
+        <pc:chgData name="Yoshiharu Hamaguchi" userId="470e288704938fe9" providerId="LiveId" clId="{46C12E7F-E35C-42BF-B856-810C3AAE2138}" dt="2024-08-17T07:14:18.771" v="52" actId="20577"/>
+        <pc:sldMkLst>
+          <pc:docMk/>
+          <pc:sldMk cId="3586103662" sldId="259"/>
+        </pc:sldMkLst>
+        <pc:spChg chg="mod">
+          <ac:chgData name="Yoshiharu Hamaguchi" userId="470e288704938fe9" providerId="LiveId" clId="{46C12E7F-E35C-42BF-B856-810C3AAE2138}" dt="2024-08-17T07:14:18.771" v="52" actId="20577"/>
+          <ac:spMkLst>
+            <pc:docMk/>
+            <pc:sldMk cId="3586103662" sldId="259"/>
+            <ac:spMk id="3" creationId="{37025C41-8921-578C-16F8-6B5CF0A93AE0}"/>
+          </ac:spMkLst>
+        </pc:spChg>
+      </pc:sldChg>
+      <pc:sldChg chg="modSp mod">
+        <pc:chgData name="Yoshiharu Hamaguchi" userId="470e288704938fe9" providerId="LiveId" clId="{46C12E7F-E35C-42BF-B856-810C3AAE2138}" dt="2024-08-17T07:13:56.935" v="45" actId="27636"/>
+        <pc:sldMkLst>
+          <pc:docMk/>
+          <pc:sldMk cId="3422986759" sldId="260"/>
+        </pc:sldMkLst>
+        <pc:spChg chg="mod">
+          <ac:chgData name="Yoshiharu Hamaguchi" userId="470e288704938fe9" providerId="LiveId" clId="{46C12E7F-E35C-42BF-B856-810C3AAE2138}" dt="2024-08-17T07:13:56.935" v="45" actId="27636"/>
+          <ac:spMkLst>
+            <pc:docMk/>
+            <pc:sldMk cId="3422986759" sldId="260"/>
+            <ac:spMk id="3" creationId="{37025C41-8921-578C-16F8-6B5CF0A93AE0}"/>
+          </ac:spMkLst>
+        </pc:spChg>
+      </pc:sldChg>
+      <pc:sldChg chg="modSp mod">
+        <pc:chgData name="Yoshiharu Hamaguchi" userId="470e288704938fe9" providerId="LiveId" clId="{46C12E7F-E35C-42BF-B856-810C3AAE2138}" dt="2024-08-17T07:15:42.746" v="129" actId="20577"/>
+        <pc:sldMkLst>
+          <pc:docMk/>
+          <pc:sldMk cId="4019972730" sldId="262"/>
+        </pc:sldMkLst>
+        <pc:spChg chg="mod">
+          <ac:chgData name="Yoshiharu Hamaguchi" userId="470e288704938fe9" providerId="LiveId" clId="{46C12E7F-E35C-42BF-B856-810C3AAE2138}" dt="2024-08-17T07:15:42.746" v="129" actId="20577"/>
+          <ac:spMkLst>
+            <pc:docMk/>
+            <pc:sldMk cId="4019972730" sldId="262"/>
+            <ac:spMk id="3" creationId="{37025C41-8921-578C-16F8-6B5CF0A93AE0}"/>
+          </ac:spMkLst>
+        </pc:spChg>
+      </pc:sldChg>
+    </pc:docChg>
+  </pc:docChgLst>
+  <pc:docChgLst>
+    <pc:chgData name="Yoshiharu Hamaguchi" userId="470e288704938fe9" providerId="LiveId" clId="{C43607F1-232B-44DB-B3B2-14DEC55E9315}"/>
+    <pc:docChg chg="undo redo custSel addSld delSld modSld sldOrd">
+      <pc:chgData name="Yoshiharu Hamaguchi" userId="470e288704938fe9" providerId="LiveId" clId="{C43607F1-232B-44DB-B3B2-14DEC55E9315}" dt="2024-09-25T15:43:37.002" v="6824" actId="6549"/>
+      <pc:docMkLst>
+        <pc:docMk/>
+      </pc:docMkLst>
+      <pc:sldChg chg="modSp mod">
+        <pc:chgData name="Yoshiharu Hamaguchi" userId="470e288704938fe9" providerId="LiveId" clId="{C43607F1-232B-44DB-B3B2-14DEC55E9315}" dt="2024-09-25T15:42:09.206" v="6806" actId="20577"/>
+        <pc:sldMkLst>
+          <pc:docMk/>
+          <pc:sldMk cId="634982452" sldId="256"/>
+        </pc:sldMkLst>
+        <pc:spChg chg="mod">
+          <ac:chgData name="Yoshiharu Hamaguchi" userId="470e288704938fe9" providerId="LiveId" clId="{C43607F1-232B-44DB-B3B2-14DEC55E9315}" dt="2024-09-25T10:11:46.044" v="3377"/>
+          <ac:spMkLst>
+            <pc:docMk/>
+            <pc:sldMk cId="634982452" sldId="256"/>
+            <ac:spMk id="2" creationId="{3F0D190A-A8DB-32F1-0D56-13F6D381B778}"/>
+          </ac:spMkLst>
+        </pc:spChg>
+        <pc:spChg chg="mod">
+          <ac:chgData name="Yoshiharu Hamaguchi" userId="470e288704938fe9" providerId="LiveId" clId="{C43607F1-232B-44DB-B3B2-14DEC55E9315}" dt="2024-09-25T15:42:09.206" v="6806" actId="20577"/>
+          <ac:spMkLst>
+            <pc:docMk/>
+            <pc:sldMk cId="634982452" sldId="256"/>
+            <ac:spMk id="3" creationId="{BC817A74-920C-0926-7C76-24BA4993B9F3}"/>
+          </ac:spMkLst>
+        </pc:spChg>
+      </pc:sldChg>
+      <pc:sldChg chg="modSp mod ord">
+        <pc:chgData name="Yoshiharu Hamaguchi" userId="470e288704938fe9" providerId="LiveId" clId="{C43607F1-232B-44DB-B3B2-14DEC55E9315}" dt="2024-09-25T15:42:24.869" v="6815" actId="20577"/>
+        <pc:sldMkLst>
+          <pc:docMk/>
+          <pc:sldMk cId="4019972730" sldId="262"/>
+        </pc:sldMkLst>
+        <pc:spChg chg="mod">
+          <ac:chgData name="Yoshiharu Hamaguchi" userId="470e288704938fe9" providerId="LiveId" clId="{C43607F1-232B-44DB-B3B2-14DEC55E9315}" dt="2024-09-25T10:11:46.044" v="3377"/>
+          <ac:spMkLst>
+            <pc:docMk/>
+            <pc:sldMk cId="4019972730" sldId="262"/>
+            <ac:spMk id="2" creationId="{9C784ACA-9376-15C6-DD93-68B5D582FADA}"/>
+          </ac:spMkLst>
+        </pc:spChg>
+        <pc:spChg chg="mod">
+          <ac:chgData name="Yoshiharu Hamaguchi" userId="470e288704938fe9" providerId="LiveId" clId="{C43607F1-232B-44DB-B3B2-14DEC55E9315}" dt="2024-09-25T15:42:24.869" v="6815" actId="20577"/>
+          <ac:spMkLst>
+            <pc:docMk/>
+            <pc:sldMk cId="4019972730" sldId="262"/>
+            <ac:spMk id="3" creationId="{37025C41-8921-578C-16F8-6B5CF0A93AE0}"/>
+          </ac:spMkLst>
+        </pc:spChg>
+      </pc:sldChg>
+      <pc:sldChg chg="modSp add mod">
+        <pc:chgData name="Yoshiharu Hamaguchi" userId="470e288704938fe9" providerId="LiveId" clId="{C43607F1-232B-44DB-B3B2-14DEC55E9315}" dt="2024-09-25T15:42:58.235" v="6817" actId="20577"/>
+        <pc:sldMkLst>
+          <pc:docMk/>
+          <pc:sldMk cId="958570635" sldId="263"/>
+        </pc:sldMkLst>
+        <pc:spChg chg="mod">
+          <ac:chgData name="Yoshiharu Hamaguchi" userId="470e288704938fe9" providerId="LiveId" clId="{C43607F1-232B-44DB-B3B2-14DEC55E9315}" dt="2024-09-25T15:42:58.235" v="6817" actId="20577"/>
+          <ac:spMkLst>
+            <pc:docMk/>
+            <pc:sldMk cId="958570635" sldId="263"/>
+            <ac:spMk id="2" creationId="{9C784ACA-9376-15C6-DD93-68B5D582FADA}"/>
+          </ac:spMkLst>
+        </pc:spChg>
+        <pc:spChg chg="mod">
+          <ac:chgData name="Yoshiharu Hamaguchi" userId="470e288704938fe9" providerId="LiveId" clId="{C43607F1-232B-44DB-B3B2-14DEC55E9315}" dt="2024-09-25T11:59:29.129" v="5429" actId="20577"/>
+          <ac:spMkLst>
+            <pc:docMk/>
+            <pc:sldMk cId="958570635" sldId="263"/>
+            <ac:spMk id="3" creationId="{37025C41-8921-578C-16F8-6B5CF0A93AE0}"/>
+          </ac:spMkLst>
+        </pc:spChg>
+      </pc:sldChg>
+      <pc:sldChg chg="modSp add mod">
+        <pc:chgData name="Yoshiharu Hamaguchi" userId="470e288704938fe9" providerId="LiveId" clId="{C43607F1-232B-44DB-B3B2-14DEC55E9315}" dt="2024-09-25T15:43:37.002" v="6824" actId="6549"/>
+        <pc:sldMkLst>
+          <pc:docMk/>
+          <pc:sldMk cId="3365730422" sldId="264"/>
+        </pc:sldMkLst>
+        <pc:spChg chg="mod">
+          <ac:chgData name="Yoshiharu Hamaguchi" userId="470e288704938fe9" providerId="LiveId" clId="{C43607F1-232B-44DB-B3B2-14DEC55E9315}" dt="2024-09-25T10:11:46.044" v="3377"/>
+          <ac:spMkLst>
+            <pc:docMk/>
+            <pc:sldMk cId="3365730422" sldId="264"/>
+            <ac:spMk id="2" creationId="{9C784ACA-9376-15C6-DD93-68B5D582FADA}"/>
+          </ac:spMkLst>
+        </pc:spChg>
+        <pc:spChg chg="mod">
+          <ac:chgData name="Yoshiharu Hamaguchi" userId="470e288704938fe9" providerId="LiveId" clId="{C43607F1-232B-44DB-B3B2-14DEC55E9315}" dt="2024-09-25T15:43:37.002" v="6824" actId="6549"/>
+          <ac:spMkLst>
+            <pc:docMk/>
+            <pc:sldMk cId="3365730422" sldId="264"/>
+            <ac:spMk id="3" creationId="{37025C41-8921-578C-16F8-6B5CF0A93AE0}"/>
+          </ac:spMkLst>
+        </pc:spChg>
+      </pc:sldChg>
+      <pc:sldChg chg="modSp add mod">
+        <pc:chgData name="Yoshiharu Hamaguchi" userId="470e288704938fe9" providerId="LiveId" clId="{C43607F1-232B-44DB-B3B2-14DEC55E9315}" dt="2024-09-25T15:43:14.495" v="6821" actId="20577"/>
+        <pc:sldMkLst>
+          <pc:docMk/>
+          <pc:sldMk cId="3485624740" sldId="265"/>
+        </pc:sldMkLst>
+        <pc:spChg chg="mod">
+          <ac:chgData name="Yoshiharu Hamaguchi" userId="470e288704938fe9" providerId="LiveId" clId="{C43607F1-232B-44DB-B3B2-14DEC55E9315}" dt="2024-09-25T15:43:06.076" v="6818" actId="20577"/>
+          <ac:spMkLst>
+            <pc:docMk/>
+            <pc:sldMk cId="3485624740" sldId="265"/>
+            <ac:spMk id="2" creationId="{9C784ACA-9376-15C6-DD93-68B5D582FADA}"/>
+          </ac:spMkLst>
+        </pc:spChg>
+        <pc:spChg chg="mod">
+          <ac:chgData name="Yoshiharu Hamaguchi" userId="470e288704938fe9" providerId="LiveId" clId="{C43607F1-232B-44DB-B3B2-14DEC55E9315}" dt="2024-09-25T15:43:14.495" v="6821" actId="20577"/>
+          <ac:spMkLst>
+            <pc:docMk/>
+            <pc:sldMk cId="3485624740" sldId="265"/>
+            <ac:spMk id="3" creationId="{37025C41-8921-578C-16F8-6B5CF0A93AE0}"/>
+          </ac:spMkLst>
+        </pc:spChg>
+      </pc:sldChg>
+      <pc:sldChg chg="addSp delSp modSp add del mod ord">
+        <pc:chgData name="Yoshiharu Hamaguchi" userId="470e288704938fe9" providerId="LiveId" clId="{C43607F1-232B-44DB-B3B2-14DEC55E9315}" dt="2024-09-25T15:43:33.374" v="6823" actId="47"/>
+        <pc:sldMkLst>
+          <pc:docMk/>
+          <pc:sldMk cId="3544669301" sldId="266"/>
+        </pc:sldMkLst>
+        <pc:spChg chg="mod">
+          <ac:chgData name="Yoshiharu Hamaguchi" userId="470e288704938fe9" providerId="LiveId" clId="{C43607F1-232B-44DB-B3B2-14DEC55E9315}" dt="2024-09-25T13:30:45.185" v="6550" actId="20577"/>
+          <ac:spMkLst>
+            <pc:docMk/>
+            <pc:sldMk cId="3544669301" sldId="266"/>
+            <ac:spMk id="2" creationId="{9C784ACA-9376-15C6-DD93-68B5D582FADA}"/>
+          </ac:spMkLst>
+        </pc:spChg>
+        <pc:spChg chg="del mod">
+          <ac:chgData name="Yoshiharu Hamaguchi" userId="470e288704938fe9" providerId="LiveId" clId="{C43607F1-232B-44DB-B3B2-14DEC55E9315}" dt="2024-09-25T12:13:58.063" v="6127" actId="478"/>
+          <ac:spMkLst>
+            <pc:docMk/>
+            <pc:sldMk cId="3544669301" sldId="266"/>
+            <ac:spMk id="3" creationId="{37025C41-8921-578C-16F8-6B5CF0A93AE0}"/>
+          </ac:spMkLst>
+        </pc:spChg>
+        <pc:spChg chg="add mod">
+          <ac:chgData name="Yoshiharu Hamaguchi" userId="470e288704938fe9" providerId="LiveId" clId="{C43607F1-232B-44DB-B3B2-14DEC55E9315}" dt="2024-09-25T15:24:02.544" v="6637" actId="20577"/>
+          <ac:spMkLst>
+            <pc:docMk/>
+            <pc:sldMk cId="3544669301" sldId="266"/>
+            <ac:spMk id="4" creationId="{8C13C9CE-666C-02A7-9EAA-106F1B50AE66}"/>
+          </ac:spMkLst>
+        </pc:spChg>
+        <pc:spChg chg="add mod">
+          <ac:chgData name="Yoshiharu Hamaguchi" userId="470e288704938fe9" providerId="LiveId" clId="{C43607F1-232B-44DB-B3B2-14DEC55E9315}" dt="2024-09-25T15:23:37.841" v="6553" actId="1076"/>
+          <ac:spMkLst>
+            <pc:docMk/>
+            <pc:sldMk cId="3544669301" sldId="266"/>
+            <ac:spMk id="5" creationId="{38525753-506C-CF9E-DF2A-0368D654E503}"/>
+          </ac:spMkLst>
+        </pc:spChg>
+        <pc:graphicFrameChg chg="add del mod">
+          <ac:chgData name="Yoshiharu Hamaguchi" userId="470e288704938fe9" providerId="LiveId" clId="{C43607F1-232B-44DB-B3B2-14DEC55E9315}" dt="2024-09-25T09:11:35.706" v="3118" actId="478"/>
+          <ac:graphicFrameMkLst>
+            <pc:docMk/>
+            <pc:sldMk cId="3544669301" sldId="266"/>
+            <ac:graphicFrameMk id="4" creationId="{9638860F-7C2B-CB75-3633-23A88AD1CFFF}"/>
+          </ac:graphicFrameMkLst>
+        </pc:graphicFrameChg>
+      </pc:sldChg>
+      <pc:sldChg chg="addSp delSp modSp add mod">
+        <pc:chgData name="Yoshiharu Hamaguchi" userId="470e288704938fe9" providerId="LiveId" clId="{C43607F1-232B-44DB-B3B2-14DEC55E9315}" dt="2024-09-25T15:43:23.111" v="6822" actId="20577"/>
+        <pc:sldMkLst>
+          <pc:docMk/>
+          <pc:sldMk cId="768576187" sldId="267"/>
+        </pc:sldMkLst>
+        <pc:spChg chg="mod">
+          <ac:chgData name="Yoshiharu Hamaguchi" userId="470e288704938fe9" providerId="LiveId" clId="{C43607F1-232B-44DB-B3B2-14DEC55E9315}" dt="2024-09-25T15:43:23.111" v="6822" actId="20577"/>
+          <ac:spMkLst>
+            <pc:docMk/>
+            <pc:sldMk cId="768576187" sldId="267"/>
+            <ac:spMk id="2" creationId="{9C784ACA-9376-15C6-DD93-68B5D582FADA}"/>
+          </ac:spMkLst>
+        </pc:spChg>
+        <pc:spChg chg="mod">
+          <ac:chgData name="Yoshiharu Hamaguchi" userId="470e288704938fe9" providerId="LiveId" clId="{C43607F1-232B-44DB-B3B2-14DEC55E9315}" dt="2024-09-25T12:39:33.816" v="6418" actId="20577"/>
+          <ac:spMkLst>
+            <pc:docMk/>
+            <pc:sldMk cId="768576187" sldId="267"/>
+            <ac:spMk id="3" creationId="{37025C41-8921-578C-16F8-6B5CF0A93AE0}"/>
+          </ac:spMkLst>
+        </pc:spChg>
+        <pc:graphicFrameChg chg="add mod">
+          <ac:chgData name="Yoshiharu Hamaguchi" userId="470e288704938fe9" providerId="LiveId" clId="{C43607F1-232B-44DB-B3B2-14DEC55E9315}" dt="2024-09-25T12:12:56.408" v="6045" actId="1076"/>
+          <ac:graphicFrameMkLst>
+            <pc:docMk/>
+            <pc:sldMk cId="768576187" sldId="267"/>
+            <ac:graphicFrameMk id="4" creationId="{4E5D5511-B581-66FB-A2EC-FFB9111D8C73}"/>
+          </ac:graphicFrameMkLst>
+        </pc:graphicFrameChg>
+        <pc:graphicFrameChg chg="del">
+          <ac:chgData name="Yoshiharu Hamaguchi" userId="470e288704938fe9" providerId="LiveId" clId="{C43607F1-232B-44DB-B3B2-14DEC55E9315}" dt="2024-09-25T09:09:05.412" v="2871" actId="478"/>
+          <ac:graphicFrameMkLst>
+            <pc:docMk/>
+            <pc:sldMk cId="768576187" sldId="267"/>
+            <ac:graphicFrameMk id="4" creationId="{9638860F-7C2B-CB75-3633-23A88AD1CFFF}"/>
+          </ac:graphicFrameMkLst>
+        </pc:graphicFrameChg>
+      </pc:sldChg>
+      <pc:sldChg chg="addSp delSp modSp add del mod">
+        <pc:chgData name="Yoshiharu Hamaguchi" userId="470e288704938fe9" providerId="LiveId" clId="{C43607F1-232B-44DB-B3B2-14DEC55E9315}" dt="2024-09-25T15:41:14.757" v="6783" actId="47"/>
+        <pc:sldMkLst>
+          <pc:docMk/>
+          <pc:sldMk cId="840589698" sldId="268"/>
+        </pc:sldMkLst>
+        <pc:spChg chg="mod">
+          <ac:chgData name="Yoshiharu Hamaguchi" userId="470e288704938fe9" providerId="LiveId" clId="{C43607F1-232B-44DB-B3B2-14DEC55E9315}" dt="2024-09-25T11:54:23.312" v="5068" actId="20577"/>
+          <ac:spMkLst>
+            <pc:docMk/>
+            <pc:sldMk cId="840589698" sldId="268"/>
+            <ac:spMk id="2" creationId="{9C784ACA-9376-15C6-DD93-68B5D582FADA}"/>
+          </ac:spMkLst>
+        </pc:spChg>
+        <pc:spChg chg="mod">
+          <ac:chgData name="Yoshiharu Hamaguchi" userId="470e288704938fe9" providerId="LiveId" clId="{C43607F1-232B-44DB-B3B2-14DEC55E9315}" dt="2024-09-25T11:55:02.095" v="5109" actId="1035"/>
+          <ac:spMkLst>
+            <pc:docMk/>
+            <pc:sldMk cId="840589698" sldId="268"/>
+            <ac:spMk id="3" creationId="{37025C41-8921-578C-16F8-6B5CF0A93AE0}"/>
+          </ac:spMkLst>
+        </pc:spChg>
+        <pc:spChg chg="add del mod">
+          <ac:chgData name="Yoshiharu Hamaguchi" userId="470e288704938fe9" providerId="LiveId" clId="{C43607F1-232B-44DB-B3B2-14DEC55E9315}" dt="2024-09-25T10:16:39.785" v="3447" actId="11529"/>
+          <ac:spMkLst>
+            <pc:docMk/>
+            <pc:sldMk cId="840589698" sldId="268"/>
+            <ac:spMk id="4" creationId="{F98FC884-FBB8-61AD-34FB-0D85D813F28B}"/>
+          </ac:spMkLst>
+        </pc:spChg>
+        <pc:spChg chg="add mod">
+          <ac:chgData name="Yoshiharu Hamaguchi" userId="470e288704938fe9" providerId="LiveId" clId="{C43607F1-232B-44DB-B3B2-14DEC55E9315}" dt="2024-09-25T10:16:39.267" v="3446" actId="571"/>
+          <ac:spMkLst>
+            <pc:docMk/>
+            <pc:sldMk cId="840589698" sldId="268"/>
+            <ac:spMk id="5" creationId="{F23FD391-2473-6A83-F034-27A86E8878C2}"/>
+          </ac:spMkLst>
+        </pc:spChg>
+        <pc:spChg chg="add del">
+          <ac:chgData name="Yoshiharu Hamaguchi" userId="470e288704938fe9" providerId="LiveId" clId="{C43607F1-232B-44DB-B3B2-14DEC55E9315}" dt="2024-09-25T10:18:36.849" v="3472" actId="478"/>
+          <ac:spMkLst>
+            <pc:docMk/>
+            <pc:sldMk cId="840589698" sldId="268"/>
+            <ac:spMk id="12" creationId="{5320D42A-23DA-4C62-811E-03B9E5D4BC45}"/>
+          </ac:spMkLst>
+        </pc:spChg>
+        <pc:spChg chg="add mod">
+          <ac:chgData name="Yoshiharu Hamaguchi" userId="470e288704938fe9" providerId="LiveId" clId="{C43607F1-232B-44DB-B3B2-14DEC55E9315}" dt="2024-09-25T12:00:41.153" v="5465" actId="20577"/>
+          <ac:spMkLst>
+            <pc:docMk/>
+            <pc:sldMk cId="840589698" sldId="268"/>
+            <ac:spMk id="17" creationId="{22EFD490-063C-E600-DC74-E61C4AD29849}"/>
+          </ac:spMkLst>
+        </pc:spChg>
+        <pc:spChg chg="add del mod">
+          <ac:chgData name="Yoshiharu Hamaguchi" userId="470e288704938fe9" providerId="LiveId" clId="{C43607F1-232B-44DB-B3B2-14DEC55E9315}" dt="2024-09-25T10:21:45.687" v="3627"/>
+          <ac:spMkLst>
+            <pc:docMk/>
+            <pc:sldMk cId="840589698" sldId="268"/>
+            <ac:spMk id="18" creationId="{AFC52DAA-C20B-D63E-784B-8FAFBC832FAE}"/>
+          </ac:spMkLst>
+        </pc:spChg>
+        <pc:spChg chg="add mod">
+          <ac:chgData name="Yoshiharu Hamaguchi" userId="470e288704938fe9" providerId="LiveId" clId="{C43607F1-232B-44DB-B3B2-14DEC55E9315}" dt="2024-09-25T11:55:02.095" v="5109" actId="1035"/>
+          <ac:spMkLst>
+            <pc:docMk/>
+            <pc:sldMk cId="840589698" sldId="268"/>
+            <ac:spMk id="19" creationId="{2CDCB588-1E89-B1B4-BB6B-210B5ECD1361}"/>
+          </ac:spMkLst>
+        </pc:spChg>
+        <pc:spChg chg="add mod">
+          <ac:chgData name="Yoshiharu Hamaguchi" userId="470e288704938fe9" providerId="LiveId" clId="{C43607F1-232B-44DB-B3B2-14DEC55E9315}" dt="2024-09-25T11:55:02.095" v="5109" actId="1035"/>
+          <ac:spMkLst>
+            <pc:docMk/>
+            <pc:sldMk cId="840589698" sldId="268"/>
+            <ac:spMk id="20" creationId="{5D996A43-DC64-4070-A3C0-8AEBA9493CE6}"/>
+          </ac:spMkLst>
+        </pc:spChg>
+        <pc:spChg chg="add mod">
+          <ac:chgData name="Yoshiharu Hamaguchi" userId="470e288704938fe9" providerId="LiveId" clId="{C43607F1-232B-44DB-B3B2-14DEC55E9315}" dt="2024-09-25T12:01:51.040" v="5503" actId="20577"/>
+          <ac:spMkLst>
+            <pc:docMk/>
+            <pc:sldMk cId="840589698" sldId="268"/>
+            <ac:spMk id="21" creationId="{7EB19867-148A-D7FC-9274-4234BFD3440B}"/>
+          </ac:spMkLst>
+        </pc:spChg>
+        <pc:spChg chg="add mod">
+          <ac:chgData name="Yoshiharu Hamaguchi" userId="470e288704938fe9" providerId="LiveId" clId="{C43607F1-232B-44DB-B3B2-14DEC55E9315}" dt="2024-09-25T10:22:00.581" v="3631" actId="571"/>
+          <ac:spMkLst>
+            <pc:docMk/>
+            <pc:sldMk cId="840589698" sldId="268"/>
+            <ac:spMk id="22" creationId="{CBA24C83-4831-1386-386F-530CF522B95C}"/>
+          </ac:spMkLst>
+        </pc:spChg>
+        <pc:spChg chg="add mod">
+          <ac:chgData name="Yoshiharu Hamaguchi" userId="470e288704938fe9" providerId="LiveId" clId="{C43607F1-232B-44DB-B3B2-14DEC55E9315}" dt="2024-09-25T10:22:00.581" v="3631" actId="571"/>
+          <ac:spMkLst>
+            <pc:docMk/>
+            <pc:sldMk cId="840589698" sldId="268"/>
+            <ac:spMk id="23" creationId="{0D782016-83C1-6806-9341-108657EA9BA8}"/>
+          </ac:spMkLst>
+        </pc:spChg>
+        <pc:spChg chg="add mod ord">
+          <ac:chgData name="Yoshiharu Hamaguchi" userId="470e288704938fe9" providerId="LiveId" clId="{C43607F1-232B-44DB-B3B2-14DEC55E9315}" dt="2024-09-25T11:55:02.095" v="5109" actId="1035"/>
+          <ac:spMkLst>
+            <pc:docMk/>
+            <pc:sldMk cId="840589698" sldId="268"/>
+            <ac:spMk id="24" creationId="{2C710E95-554D-F235-C3F1-BF13E1AA1068}"/>
+          </ac:spMkLst>
+        </pc:spChg>
+        <pc:spChg chg="add mod ord">
+          <ac:chgData name="Yoshiharu Hamaguchi" userId="470e288704938fe9" providerId="LiveId" clId="{C43607F1-232B-44DB-B3B2-14DEC55E9315}" dt="2024-09-25T11:55:02.095" v="5109" actId="1035"/>
+          <ac:spMkLst>
+            <pc:docMk/>
+            <pc:sldMk cId="840589698" sldId="268"/>
+            <ac:spMk id="25" creationId="{432FD002-C3EC-95AB-E364-BC60A7440B0A}"/>
+          </ac:spMkLst>
+        </pc:spChg>
+        <pc:spChg chg="add mod ord">
+          <ac:chgData name="Yoshiharu Hamaguchi" userId="470e288704938fe9" providerId="LiveId" clId="{C43607F1-232B-44DB-B3B2-14DEC55E9315}" dt="2024-09-25T11:55:02.095" v="5109" actId="1035"/>
+          <ac:spMkLst>
+            <pc:docMk/>
+            <pc:sldMk cId="840589698" sldId="268"/>
+            <ac:spMk id="26" creationId="{0A5DCF7B-D5B4-2BE2-5871-8EED0BA9AE2C}"/>
+          </ac:spMkLst>
+        </pc:spChg>
+        <pc:spChg chg="add mod">
+          <ac:chgData name="Yoshiharu Hamaguchi" userId="470e288704938fe9" providerId="LiveId" clId="{C43607F1-232B-44DB-B3B2-14DEC55E9315}" dt="2024-09-25T12:03:08.078" v="5525" actId="1036"/>
+          <ac:spMkLst>
+            <pc:docMk/>
+            <pc:sldMk cId="840589698" sldId="268"/>
+            <ac:spMk id="27" creationId="{D7F52068-5699-1CBA-7FBA-D813809E2F1F}"/>
+          </ac:spMkLst>
+        </pc:spChg>
+        <pc:spChg chg="add mod">
+          <ac:chgData name="Yoshiharu Hamaguchi" userId="470e288704938fe9" providerId="LiveId" clId="{C43607F1-232B-44DB-B3B2-14DEC55E9315}" dt="2024-09-25T10:27:34.883" v="3851" actId="571"/>
+          <ac:spMkLst>
+            <pc:docMk/>
+            <pc:sldMk cId="840589698" sldId="268"/>
+            <ac:spMk id="28" creationId="{FD64C395-4E8A-6520-A2FE-4A7B5009B0AB}"/>
+          </ac:spMkLst>
+        </pc:spChg>
+        <pc:spChg chg="add mod">
+          <ac:chgData name="Yoshiharu Hamaguchi" userId="470e288704938fe9" providerId="LiveId" clId="{C43607F1-232B-44DB-B3B2-14DEC55E9315}" dt="2024-09-25T10:27:38.841" v="3853" actId="571"/>
+          <ac:spMkLst>
+            <pc:docMk/>
+            <pc:sldMk cId="840589698" sldId="268"/>
+            <ac:spMk id="29" creationId="{8D074A2A-D5C9-BBC7-E92D-C9565B37A9E9}"/>
+          </ac:spMkLst>
+        </pc:spChg>
+        <pc:spChg chg="add mod">
+          <ac:chgData name="Yoshiharu Hamaguchi" userId="470e288704938fe9" providerId="LiveId" clId="{C43607F1-232B-44DB-B3B2-14DEC55E9315}" dt="2024-09-25T11:55:02.095" v="5109" actId="1035"/>
+          <ac:spMkLst>
+            <pc:docMk/>
+            <pc:sldMk cId="840589698" sldId="268"/>
+            <ac:spMk id="30" creationId="{9F8A6BA6-9C05-8916-B855-7146EEBA1167}"/>
+          </ac:spMkLst>
+        </pc:spChg>
+        <pc:spChg chg="add mod">
+          <ac:chgData name="Yoshiharu Hamaguchi" userId="470e288704938fe9" providerId="LiveId" clId="{C43607F1-232B-44DB-B3B2-14DEC55E9315}" dt="2024-09-25T11:55:02.095" v="5109" actId="1035"/>
+          <ac:spMkLst>
+            <pc:docMk/>
+            <pc:sldMk cId="840589698" sldId="268"/>
+            <ac:spMk id="31" creationId="{84235BB5-BE18-15D2-8BB3-E9CB549D6AB3}"/>
+          </ac:spMkLst>
+        </pc:spChg>
+        <pc:spChg chg="add mod">
+          <ac:chgData name="Yoshiharu Hamaguchi" userId="470e288704938fe9" providerId="LiveId" clId="{C43607F1-232B-44DB-B3B2-14DEC55E9315}" dt="2024-09-25T11:55:02.095" v="5109" actId="1035"/>
+          <ac:spMkLst>
+            <pc:docMk/>
+            <pc:sldMk cId="840589698" sldId="268"/>
+            <ac:spMk id="32" creationId="{CD126C2D-904F-6F62-E142-CA8F1BBD0251}"/>
+          </ac:spMkLst>
+        </pc:spChg>
+        <pc:spChg chg="add mod">
+          <ac:chgData name="Yoshiharu Hamaguchi" userId="470e288704938fe9" providerId="LiveId" clId="{C43607F1-232B-44DB-B3B2-14DEC55E9315}" dt="2024-09-25T11:55:02.095" v="5109" actId="1035"/>
+          <ac:spMkLst>
+            <pc:docMk/>
+            <pc:sldMk cId="840589698" sldId="268"/>
+            <ac:spMk id="33" creationId="{0FB338FD-35EF-30D7-06A9-7A1B992B2830}"/>
+          </ac:spMkLst>
+        </pc:spChg>
+        <pc:spChg chg="add del mod">
+          <ac:chgData name="Yoshiharu Hamaguchi" userId="470e288704938fe9" providerId="LiveId" clId="{C43607F1-232B-44DB-B3B2-14DEC55E9315}" dt="2024-09-25T10:35:09.999" v="4180" actId="478"/>
+          <ac:spMkLst>
+            <pc:docMk/>
+            <pc:sldMk cId="840589698" sldId="268"/>
+            <ac:spMk id="34" creationId="{A50A472D-4099-8DAF-24F2-AF418F2F9C79}"/>
+          </ac:spMkLst>
+        </pc:spChg>
+        <pc:spChg chg="add mod">
+          <ac:chgData name="Yoshiharu Hamaguchi" userId="470e288704938fe9" providerId="LiveId" clId="{C43607F1-232B-44DB-B3B2-14DEC55E9315}" dt="2024-09-25T11:55:02.095" v="5109" actId="1035"/>
+          <ac:spMkLst>
+            <pc:docMk/>
+            <pc:sldMk cId="840589698" sldId="268"/>
+            <ac:spMk id="35" creationId="{1AFFE9F5-AE2D-EBB6-D84B-C52DD42E357B}"/>
+          </ac:spMkLst>
+        </pc:spChg>
+        <pc:spChg chg="add mod">
+          <ac:chgData name="Yoshiharu Hamaguchi" userId="470e288704938fe9" providerId="LiveId" clId="{C43607F1-232B-44DB-B3B2-14DEC55E9315}" dt="2024-09-25T10:39:29.891" v="4299" actId="571"/>
+          <ac:spMkLst>
+            <pc:docMk/>
+            <pc:sldMk cId="840589698" sldId="268"/>
+            <ac:spMk id="36" creationId="{24F56B13-3AC6-7FDD-8B46-EE30294A3D96}"/>
+          </ac:spMkLst>
+        </pc:spChg>
+        <pc:spChg chg="add mod ord">
+          <ac:chgData name="Yoshiharu Hamaguchi" userId="470e288704938fe9" providerId="LiveId" clId="{C43607F1-232B-44DB-B3B2-14DEC55E9315}" dt="2024-09-25T11:55:02.095" v="5109" actId="1035"/>
+          <ac:spMkLst>
+            <pc:docMk/>
+            <pc:sldMk cId="840589698" sldId="268"/>
+            <ac:spMk id="37" creationId="{D1058EA4-8932-1FDF-0C0E-3BD94FD33D65}"/>
+          </ac:spMkLst>
+        </pc:spChg>
+        <pc:spChg chg="add mod ord">
+          <ac:chgData name="Yoshiharu Hamaguchi" userId="470e288704938fe9" providerId="LiveId" clId="{C43607F1-232B-44DB-B3B2-14DEC55E9315}" dt="2024-09-25T11:55:02.095" v="5109" actId="1035"/>
+          <ac:spMkLst>
+            <pc:docMk/>
+            <pc:sldMk cId="840589698" sldId="268"/>
+            <ac:spMk id="38" creationId="{1A3E6AA3-18D3-7A9B-F0B1-B7633BF22430}"/>
+          </ac:spMkLst>
+        </pc:spChg>
+        <pc:spChg chg="add mod ord">
+          <ac:chgData name="Yoshiharu Hamaguchi" userId="470e288704938fe9" providerId="LiveId" clId="{C43607F1-232B-44DB-B3B2-14DEC55E9315}" dt="2024-09-25T11:55:02.095" v="5109" actId="1035"/>
+          <ac:spMkLst>
+            <pc:docMk/>
+            <pc:sldMk cId="840589698" sldId="268"/>
+            <ac:spMk id="39" creationId="{8A7149DE-6BB3-5177-C779-82DBB0881054}"/>
+          </ac:spMkLst>
+        </pc:spChg>
+        <pc:spChg chg="add mod">
+          <ac:chgData name="Yoshiharu Hamaguchi" userId="470e288704938fe9" providerId="LiveId" clId="{C43607F1-232B-44DB-B3B2-14DEC55E9315}" dt="2024-09-25T11:55:02.095" v="5109" actId="1035"/>
+          <ac:spMkLst>
+            <pc:docMk/>
+            <pc:sldMk cId="840589698" sldId="268"/>
+            <ac:spMk id="40" creationId="{AE3EDBDD-CC31-46D4-A001-B6C397E7D5A7}"/>
+          </ac:spMkLst>
+        </pc:spChg>
+        <pc:spChg chg="add mod">
+          <ac:chgData name="Yoshiharu Hamaguchi" userId="470e288704938fe9" providerId="LiveId" clId="{C43607F1-232B-44DB-B3B2-14DEC55E9315}" dt="2024-09-25T12:02:19.942" v="5505" actId="20577"/>
+          <ac:spMkLst>
+            <pc:docMk/>
+            <pc:sldMk cId="840589698" sldId="268"/>
+            <ac:spMk id="41" creationId="{78EB841D-7EEE-856E-2816-A546A25A6747}"/>
+          </ac:spMkLst>
+        </pc:spChg>
+        <pc:spChg chg="add mod">
+          <ac:chgData name="Yoshiharu Hamaguchi" userId="470e288704938fe9" providerId="LiveId" clId="{C43607F1-232B-44DB-B3B2-14DEC55E9315}" dt="2024-09-25T11:55:02.095" v="5109" actId="1035"/>
+          <ac:spMkLst>
+            <pc:docMk/>
+            <pc:sldMk cId="840589698" sldId="268"/>
+            <ac:spMk id="42" creationId="{25617D89-2A2A-DD7D-7316-1D4B0FFFD10C}"/>
+          </ac:spMkLst>
+        </pc:spChg>
+        <pc:spChg chg="add mod">
+          <ac:chgData name="Yoshiharu Hamaguchi" userId="470e288704938fe9" providerId="LiveId" clId="{C43607F1-232B-44DB-B3B2-14DEC55E9315}" dt="2024-09-25T11:55:02.095" v="5109" actId="1035"/>
+          <ac:spMkLst>
+            <pc:docMk/>
+            <pc:sldMk cId="840589698" sldId="268"/>
+            <ac:spMk id="43" creationId="{5FCB99EE-0845-55B5-25FB-9528EA5E62DB}"/>
+          </ac:spMkLst>
+        </pc:spChg>
+        <pc:spChg chg="add del">
+          <ac:chgData name="Yoshiharu Hamaguchi" userId="470e288704938fe9" providerId="LiveId" clId="{C43607F1-232B-44DB-B3B2-14DEC55E9315}" dt="2024-09-25T11:27:52.577" v="4545" actId="11529"/>
+          <ac:spMkLst>
+            <pc:docMk/>
+            <pc:sldMk cId="840589698" sldId="268"/>
+            <ac:spMk id="46" creationId="{864648D8-4C7D-49CB-AC03-A530324A6D1F}"/>
+          </ac:spMkLst>
+        </pc:spChg>
+        <pc:spChg chg="add mod">
+          <ac:chgData name="Yoshiharu Hamaguchi" userId="470e288704938fe9" providerId="LiveId" clId="{C43607F1-232B-44DB-B3B2-14DEC55E9315}" dt="2024-09-25T12:22:51.936" v="6363" actId="1076"/>
+          <ac:spMkLst>
+            <pc:docMk/>
+            <pc:sldMk cId="840589698" sldId="268"/>
+            <ac:spMk id="53" creationId="{2EBDE60C-B3C7-8BCA-38EB-2B2EE296631D}"/>
+          </ac:spMkLst>
+        </pc:spChg>
+        <pc:spChg chg="add mod">
+          <ac:chgData name="Yoshiharu Hamaguchi" userId="470e288704938fe9" providerId="LiveId" clId="{C43607F1-232B-44DB-B3B2-14DEC55E9315}" dt="2024-09-25T11:29:12.246" v="4591" actId="571"/>
+          <ac:spMkLst>
+            <pc:docMk/>
+            <pc:sldMk cId="840589698" sldId="268"/>
+            <ac:spMk id="54" creationId="{64213D1F-62E0-6FE2-8DD0-98A0F7965A20}"/>
+          </ac:spMkLst>
+        </pc:spChg>
+        <pc:spChg chg="add mod">
+          <ac:chgData name="Yoshiharu Hamaguchi" userId="470e288704938fe9" providerId="LiveId" clId="{C43607F1-232B-44DB-B3B2-14DEC55E9315}" dt="2024-09-25T11:30:21.518" v="4611" actId="571"/>
+          <ac:spMkLst>
+            <pc:docMk/>
+            <pc:sldMk cId="840589698" sldId="268"/>
+            <ac:spMk id="69" creationId="{87F80CD8-AD9D-76E0-D20C-888BEB7DBF63}"/>
+          </ac:spMkLst>
+        </pc:spChg>
+        <pc:spChg chg="add mod">
+          <ac:chgData name="Yoshiharu Hamaguchi" userId="470e288704938fe9" providerId="LiveId" clId="{C43607F1-232B-44DB-B3B2-14DEC55E9315}" dt="2024-09-25T11:55:02.095" v="5109" actId="1035"/>
+          <ac:spMkLst>
+            <pc:docMk/>
+            <pc:sldMk cId="840589698" sldId="268"/>
+            <ac:spMk id="72" creationId="{741FC192-317D-477E-05E4-6AE0AEEE4091}"/>
+          </ac:spMkLst>
+        </pc:spChg>
+        <pc:spChg chg="add del mod ord">
+          <ac:chgData name="Yoshiharu Hamaguchi" userId="470e288704938fe9" providerId="LiveId" clId="{C43607F1-232B-44DB-B3B2-14DEC55E9315}" dt="2024-09-25T11:42:15.199" v="4772" actId="478"/>
+          <ac:spMkLst>
+            <pc:docMk/>
+            <pc:sldMk cId="840589698" sldId="268"/>
+            <ac:spMk id="73" creationId="{F290F820-E77D-22D6-2914-B8FF9F15771A}"/>
+          </ac:spMkLst>
+        </pc:spChg>
+        <pc:spChg chg="add del mod ord">
+          <ac:chgData name="Yoshiharu Hamaguchi" userId="470e288704938fe9" providerId="LiveId" clId="{C43607F1-232B-44DB-B3B2-14DEC55E9315}" dt="2024-09-25T11:42:39.516" v="4783" actId="478"/>
+          <ac:spMkLst>
+            <pc:docMk/>
+            <pc:sldMk cId="840589698" sldId="268"/>
+            <ac:spMk id="74" creationId="{773FC1F2-A6BB-000C-C4C6-25ED96C57065}"/>
+          </ac:spMkLst>
+        </pc:spChg>
+        <pc:spChg chg="add del mod ord">
+          <ac:chgData name="Yoshiharu Hamaguchi" userId="470e288704938fe9" providerId="LiveId" clId="{C43607F1-232B-44DB-B3B2-14DEC55E9315}" dt="2024-09-25T11:42:38.906" v="4782" actId="478"/>
+          <ac:spMkLst>
+            <pc:docMk/>
+            <pc:sldMk cId="840589698" sldId="268"/>
+            <ac:spMk id="76" creationId="{579EA042-E61D-672A-3ED1-E044253656A2}"/>
+          </ac:spMkLst>
+        </pc:spChg>
+        <pc:spChg chg="add mod ord">
+          <ac:chgData name="Yoshiharu Hamaguchi" userId="470e288704938fe9" providerId="LiveId" clId="{C43607F1-232B-44DB-B3B2-14DEC55E9315}" dt="2024-09-25T13:28:46.984" v="6464" actId="207"/>
+          <ac:spMkLst>
+            <pc:docMk/>
+            <pc:sldMk cId="840589698" sldId="268"/>
+            <ac:spMk id="77" creationId="{A8393CBC-1EA9-35DD-1457-F7D76951A781}"/>
+          </ac:spMkLst>
+        </pc:spChg>
+        <pc:spChg chg="add mod">
+          <ac:chgData name="Yoshiharu Hamaguchi" userId="470e288704938fe9" providerId="LiveId" clId="{C43607F1-232B-44DB-B3B2-14DEC55E9315}" dt="2024-09-25T11:55:02.095" v="5109" actId="1035"/>
+          <ac:spMkLst>
+            <pc:docMk/>
+            <pc:sldMk cId="840589698" sldId="268"/>
+            <ac:spMk id="83" creationId="{CCD52B30-82F7-87C0-989A-283F3DA60F6E}"/>
+          </ac:spMkLst>
+        </pc:spChg>
+        <pc:spChg chg="add mod">
+          <ac:chgData name="Yoshiharu Hamaguchi" userId="470e288704938fe9" providerId="LiveId" clId="{C43607F1-232B-44DB-B3B2-14DEC55E9315}" dt="2024-09-25T13:28:31.859" v="6463" actId="13822"/>
+          <ac:spMkLst>
+            <pc:docMk/>
+            <pc:sldMk cId="840589698" sldId="268"/>
+            <ac:spMk id="84" creationId="{A83C95F3-56CE-A8BE-4166-5101A47E4447}"/>
+          </ac:spMkLst>
+        </pc:spChg>
+        <pc:spChg chg="add mod">
+          <ac:chgData name="Yoshiharu Hamaguchi" userId="470e288704938fe9" providerId="LiveId" clId="{C43607F1-232B-44DB-B3B2-14DEC55E9315}" dt="2024-09-25T13:29:00.213" v="6471" actId="20577"/>
+          <ac:spMkLst>
+            <pc:docMk/>
+            <pc:sldMk cId="840589698" sldId="268"/>
+            <ac:spMk id="185" creationId="{130A0482-3284-7713-A99C-40E52448C831}"/>
+          </ac:spMkLst>
+        </pc:spChg>
+        <pc:spChg chg="add del">
+          <ac:chgData name="Yoshiharu Hamaguchi" userId="470e288704938fe9" providerId="LiveId" clId="{C43607F1-232B-44DB-B3B2-14DEC55E9315}" dt="2024-09-25T11:55:17.262" v="5111" actId="22"/>
+          <ac:spMkLst>
+            <pc:docMk/>
+            <pc:sldMk cId="840589698" sldId="268"/>
+            <ac:spMk id="187" creationId="{87941EAC-51C0-CC28-E79E-4F55F2887F3F}"/>
+          </ac:spMkLst>
+        </pc:spChg>
+        <pc:spChg chg="add mod">
+          <ac:chgData name="Yoshiharu Hamaguchi" userId="470e288704938fe9" providerId="LiveId" clId="{C43607F1-232B-44DB-B3B2-14DEC55E9315}" dt="2024-09-25T11:56:06.974" v="5238" actId="20577"/>
+          <ac:spMkLst>
+            <pc:docMk/>
+            <pc:sldMk cId="840589698" sldId="268"/>
+            <ac:spMk id="188" creationId="{11DC7CAE-5817-27B1-97A7-D38E5318A4A0}"/>
+          </ac:spMkLst>
+        </pc:spChg>
+        <pc:grpChg chg="add del mod">
+          <ac:chgData name="Yoshiharu Hamaguchi" userId="470e288704938fe9" providerId="LiveId" clId="{C43607F1-232B-44DB-B3B2-14DEC55E9315}" dt="2024-09-25T10:17:45.403" v="3466"/>
+          <ac:grpSpMkLst>
+            <pc:docMk/>
+            <pc:sldMk cId="840589698" sldId="268"/>
+            <ac:grpSpMk id="12" creationId="{D18CFD05-BBD4-36DD-DA7F-F09469CCC1B5}"/>
+          </ac:grpSpMkLst>
+        </pc:grpChg>
+        <pc:grpChg chg="mod">
+          <ac:chgData name="Yoshiharu Hamaguchi" userId="470e288704938fe9" providerId="LiveId" clId="{C43607F1-232B-44DB-B3B2-14DEC55E9315}" dt="2024-09-25T10:17:44.851" v="3464"/>
+          <ac:grpSpMkLst>
+            <pc:docMk/>
+            <pc:sldMk cId="840589698" sldId="268"/>
+            <ac:grpSpMk id="14" creationId="{A627047E-2A2A-4D8C-231E-9EB8FB591DA6}"/>
+          </ac:grpSpMkLst>
+        </pc:grpChg>
+        <pc:picChg chg="add mod">
+          <ac:chgData name="Yoshiharu Hamaguchi" userId="470e288704938fe9" providerId="LiveId" clId="{C43607F1-232B-44DB-B3B2-14DEC55E9315}" dt="2024-09-25T13:27:50.902" v="6461" actId="27349"/>
+          <ac:picMkLst>
+            <pc:docMk/>
+            <pc:sldMk cId="840589698" sldId="268"/>
+            <ac:picMk id="45" creationId="{59F021CE-0421-4999-5D7E-4689EC7A3063}"/>
+          </ac:picMkLst>
+        </pc:picChg>
+        <pc:inkChg chg="add del">
+          <ac:chgData name="Yoshiharu Hamaguchi" userId="470e288704938fe9" providerId="LiveId" clId="{C43607F1-232B-44DB-B3B2-14DEC55E9315}" dt="2024-09-25T10:16:57.865" v="3451" actId="9405"/>
+          <ac:inkMkLst>
+            <pc:docMk/>
+            <pc:sldMk cId="840589698" sldId="268"/>
+            <ac:inkMk id="6" creationId="{FAE79509-3D4A-0016-37ED-9DFA4CF740B5}"/>
+          </ac:inkMkLst>
+        </pc:inkChg>
+        <pc:inkChg chg="add del">
+          <ac:chgData name="Yoshiharu Hamaguchi" userId="470e288704938fe9" providerId="LiveId" clId="{C43607F1-232B-44DB-B3B2-14DEC55E9315}" dt="2024-09-25T10:16:57.597" v="3450" actId="9405"/>
+          <ac:inkMkLst>
+            <pc:docMk/>
+            <pc:sldMk cId="840589698" sldId="268"/>
+            <ac:inkMk id="7" creationId="{98E353E4-EBA4-9D1B-5CD1-850702D68DDF}"/>
+          </ac:inkMkLst>
+        </pc:inkChg>
+        <pc:inkChg chg="add del">
+          <ac:chgData name="Yoshiharu Hamaguchi" userId="470e288704938fe9" providerId="LiveId" clId="{C43607F1-232B-44DB-B3B2-14DEC55E9315}" dt="2024-09-25T10:17:10.699" v="3455" actId="9405"/>
+          <ac:inkMkLst>
+            <pc:docMk/>
+            <pc:sldMk cId="840589698" sldId="268"/>
+            <ac:inkMk id="8" creationId="{B4F14106-ED05-88B4-EAA5-FEB689F36E46}"/>
+          </ac:inkMkLst>
+        </pc:inkChg>
+        <pc:inkChg chg="add del">
+          <ac:chgData name="Yoshiharu Hamaguchi" userId="470e288704938fe9" providerId="LiveId" clId="{C43607F1-232B-44DB-B3B2-14DEC55E9315}" dt="2024-09-25T10:17:10.294" v="3454" actId="9405"/>
+          <ac:inkMkLst>
+            <pc:docMk/>
+            <pc:sldMk cId="840589698" sldId="268"/>
+            <ac:inkMk id="9" creationId="{639922C2-285F-57E3-FEDB-28FF36A73624}"/>
+          </ac:inkMkLst>
+        </pc:inkChg>
+        <pc:inkChg chg="add del mod">
+          <ac:chgData name="Yoshiharu Hamaguchi" userId="470e288704938fe9" providerId="LiveId" clId="{C43607F1-232B-44DB-B3B2-14DEC55E9315}" dt="2024-09-25T10:17:45.797" v="3467" actId="9405"/>
+          <ac:inkMkLst>
+            <pc:docMk/>
+            <pc:sldMk cId="840589698" sldId="268"/>
+            <ac:inkMk id="10" creationId="{A86EA2E0-B3D3-C193-7730-F1D3FD323FDF}"/>
+          </ac:inkMkLst>
+        </pc:inkChg>
+        <pc:inkChg chg="add del mod">
+          <ac:chgData name="Yoshiharu Hamaguchi" userId="470e288704938fe9" providerId="LiveId" clId="{C43607F1-232B-44DB-B3B2-14DEC55E9315}" dt="2024-09-25T10:17:45.403" v="3466"/>
+          <ac:inkMkLst>
+            <pc:docMk/>
+            <pc:sldMk cId="840589698" sldId="268"/>
+            <ac:inkMk id="11" creationId="{72C41B7C-67A6-DEEE-2985-21572EE01F2E}"/>
+          </ac:inkMkLst>
+        </pc:inkChg>
+        <pc:inkChg chg="add del mod">
+          <ac:chgData name="Yoshiharu Hamaguchi" userId="470e288704938fe9" providerId="LiveId" clId="{C43607F1-232B-44DB-B3B2-14DEC55E9315}" dt="2024-09-25T10:17:44.851" v="3464"/>
+          <ac:inkMkLst>
+            <pc:docMk/>
+            <pc:sldMk cId="840589698" sldId="268"/>
+            <ac:inkMk id="13" creationId="{C4D40D36-0343-45FA-6BF6-4981DF8A865E}"/>
+          </ac:inkMkLst>
+        </pc:inkChg>
+        <pc:inkChg chg="add del">
+          <ac:chgData name="Yoshiharu Hamaguchi" userId="470e288704938fe9" providerId="LiveId" clId="{C43607F1-232B-44DB-B3B2-14DEC55E9315}" dt="2024-09-25T10:18:06.916" v="3469" actId="34122"/>
+          <ac:inkMkLst>
+            <pc:docMk/>
+            <pc:sldMk cId="840589698" sldId="268"/>
+            <ac:inkMk id="15" creationId="{711A4B6F-C1B4-18D2-74EE-5C16BF14D5D2}"/>
+          </ac:inkMkLst>
+        </pc:inkChg>
+        <pc:inkChg chg="add del">
+          <ac:chgData name="Yoshiharu Hamaguchi" userId="470e288704938fe9" providerId="LiveId" clId="{C43607F1-232B-44DB-B3B2-14DEC55E9315}" dt="2024-09-25T10:18:28.771" v="3471" actId="34122"/>
+          <ac:inkMkLst>
+            <pc:docMk/>
+            <pc:sldMk cId="840589698" sldId="268"/>
+            <ac:inkMk id="16" creationId="{07121A24-52BE-CAEB-F368-C5D2ADAD134F}"/>
+          </ac:inkMkLst>
+        </pc:inkChg>
+        <pc:cxnChg chg="add mod">
+          <ac:chgData name="Yoshiharu Hamaguchi" userId="470e288704938fe9" providerId="LiveId" clId="{C43607F1-232B-44DB-B3B2-14DEC55E9315}" dt="2024-09-25T13:28:04.391" v="6462" actId="208"/>
+          <ac:cxnSpMkLst>
+            <pc:docMk/>
+            <pc:sldMk cId="840589698" sldId="268"/>
+            <ac:cxnSpMk id="48" creationId="{69393153-AEE1-5B4A-D68A-93D1FD0AFD62}"/>
+          </ac:cxnSpMkLst>
+        </pc:cxnChg>
+        <pc:cxnChg chg="add mod">
+          <ac:chgData name="Yoshiharu Hamaguchi" userId="470e288704938fe9" providerId="LiveId" clId="{C43607F1-232B-44DB-B3B2-14DEC55E9315}" dt="2024-09-25T11:55:02.095" v="5109" actId="1035"/>
+          <ac:cxnSpMkLst>
+            <pc:docMk/>
+            <pc:sldMk cId="840589698" sldId="268"/>
+            <ac:cxnSpMk id="50" creationId="{CFA5960C-E2FD-D6EE-A74A-8EFFBF3FA20C}"/>
+          </ac:cxnSpMkLst>
+        </pc:cxnChg>
+        <pc:cxnChg chg="add del mod">
+          <ac:chgData name="Yoshiharu Hamaguchi" userId="470e288704938fe9" providerId="LiveId" clId="{C43607F1-232B-44DB-B3B2-14DEC55E9315}" dt="2024-09-25T11:43:35.898" v="4811" actId="478"/>
+          <ac:cxnSpMkLst>
+            <pc:docMk/>
+            <pc:sldMk cId="840589698" sldId="268"/>
+            <ac:cxnSpMk id="55" creationId="{C1E6E371-5C9C-583E-BDC4-4013BC434683}"/>
+          </ac:cxnSpMkLst>
+        </pc:cxnChg>
+        <pc:cxnChg chg="add del mod">
+          <ac:chgData name="Yoshiharu Hamaguchi" userId="470e288704938fe9" providerId="LiveId" clId="{C43607F1-232B-44DB-B3B2-14DEC55E9315}" dt="2024-09-25T11:43:33.654" v="4810" actId="478"/>
+          <ac:cxnSpMkLst>
+            <pc:docMk/>
+            <pc:sldMk cId="840589698" sldId="268"/>
+            <ac:cxnSpMk id="58" creationId="{E3C02521-E9EC-676D-ACB2-046D85CADDFF}"/>
+          </ac:cxnSpMkLst>
+        </pc:cxnChg>
+        <pc:cxnChg chg="add mod">
+          <ac:chgData name="Yoshiharu Hamaguchi" userId="470e288704938fe9" providerId="LiveId" clId="{C43607F1-232B-44DB-B3B2-14DEC55E9315}" dt="2024-09-25T11:55:02.095" v="5109" actId="1035"/>
+          <ac:cxnSpMkLst>
+            <pc:docMk/>
+            <pc:sldMk cId="840589698" sldId="268"/>
+            <ac:cxnSpMk id="61" creationId="{97380F3F-B4EC-2F06-9E3A-119161B80E1D}"/>
+          </ac:cxnSpMkLst>
+        </pc:cxnChg>
+        <pc:cxnChg chg="add mod">
+          <ac:chgData name="Yoshiharu Hamaguchi" userId="470e288704938fe9" providerId="LiveId" clId="{C43607F1-232B-44DB-B3B2-14DEC55E9315}" dt="2024-09-25T11:55:02.095" v="5109" actId="1035"/>
+          <ac:cxnSpMkLst>
+            <pc:docMk/>
+            <pc:sldMk cId="840589698" sldId="268"/>
+            <ac:cxnSpMk id="64" creationId="{7A976978-6192-9393-1108-B2E4A3E176A2}"/>
+          </ac:cxnSpMkLst>
+        </pc:cxnChg>
+        <pc:cxnChg chg="add del mod ord">
+          <ac:chgData name="Yoshiharu Hamaguchi" userId="470e288704938fe9" providerId="LiveId" clId="{C43607F1-232B-44DB-B3B2-14DEC55E9315}" dt="2024-09-25T11:55:02.095" v="5109" actId="1035"/>
+          <ac:cxnSpMkLst>
+            <pc:docMk/>
+            <pc:sldMk cId="840589698" sldId="268"/>
+            <ac:cxnSpMk id="67" creationId="{E4B332FF-DA63-222D-60B0-8C1AFCA0A5CC}"/>
+          </ac:cxnSpMkLst>
+        </pc:cxnChg>
+        <pc:cxnChg chg="add del mod">
+          <ac:chgData name="Yoshiharu Hamaguchi" userId="470e288704938fe9" providerId="LiveId" clId="{C43607F1-232B-44DB-B3B2-14DEC55E9315}" dt="2024-09-25T11:42:51.712" v="4787" actId="478"/>
+          <ac:cxnSpMkLst>
+            <pc:docMk/>
+            <pc:sldMk cId="840589698" sldId="268"/>
+            <ac:cxnSpMk id="82" creationId="{CB0EA28D-6B41-BA92-5477-F870C9BF05C8}"/>
+          </ac:cxnSpMkLst>
+        </pc:cxnChg>
+        <pc:cxnChg chg="add mod">
+          <ac:chgData name="Yoshiharu Hamaguchi" userId="470e288704938fe9" providerId="LiveId" clId="{C43607F1-232B-44DB-B3B2-14DEC55E9315}" dt="2024-09-25T11:55:02.095" v="5109" actId="1035"/>
+          <ac:cxnSpMkLst>
+            <pc:docMk/>
+            <pc:sldMk cId="840589698" sldId="268"/>
+            <ac:cxnSpMk id="85" creationId="{5521CAAD-A1E8-0103-75E1-A6496D12E07F}"/>
+          </ac:cxnSpMkLst>
+        </pc:cxnChg>
+        <pc:cxnChg chg="add mod">
+          <ac:chgData name="Yoshiharu Hamaguchi" userId="470e288704938fe9" providerId="LiveId" clId="{C43607F1-232B-44DB-B3B2-14DEC55E9315}" dt="2024-09-25T11:55:02.095" v="5109" actId="1035"/>
+          <ac:cxnSpMkLst>
+            <pc:docMk/>
+            <pc:sldMk cId="840589698" sldId="268"/>
+            <ac:cxnSpMk id="88" creationId="{4B306A65-14F2-3593-3D31-60757CB57107}"/>
+          </ac:cxnSpMkLst>
+        </pc:cxnChg>
+        <pc:cxnChg chg="add del mod">
+          <ac:chgData name="Yoshiharu Hamaguchi" userId="470e288704938fe9" providerId="LiveId" clId="{C43607F1-232B-44DB-B3B2-14DEC55E9315}" dt="2024-09-25T11:45:01.527" v="4859" actId="478"/>
+          <ac:cxnSpMkLst>
+            <pc:docMk/>
+            <pc:sldMk cId="840589698" sldId="268"/>
+            <ac:cxnSpMk id="91" creationId="{00310F9F-3183-EBDA-F940-FACA4B25E9D1}"/>
+          </ac:cxnSpMkLst>
+        </pc:cxnChg>
+        <pc:cxnChg chg="add del mod">
+          <ac:chgData name="Yoshiharu Hamaguchi" userId="470e288704938fe9" providerId="LiveId" clId="{C43607F1-232B-44DB-B3B2-14DEC55E9315}" dt="2024-09-25T11:55:02.095" v="5109" actId="1035"/>
+          <ac:cxnSpMkLst>
+            <pc:docMk/>
+            <pc:sldMk cId="840589698" sldId="268"/>
+            <ac:cxnSpMk id="124" creationId="{D3A0DDA0-90A1-7E9A-338D-464A0AB369B6}"/>
+          </ac:cxnSpMkLst>
+        </pc:cxnChg>
+        <pc:cxnChg chg="add mod">
+          <ac:chgData name="Yoshiharu Hamaguchi" userId="470e288704938fe9" providerId="LiveId" clId="{C43607F1-232B-44DB-B3B2-14DEC55E9315}" dt="2024-09-25T11:55:02.095" v="5109" actId="1035"/>
+          <ac:cxnSpMkLst>
+            <pc:docMk/>
+            <pc:sldMk cId="840589698" sldId="268"/>
+            <ac:cxnSpMk id="127" creationId="{9EC78F66-EF39-54B3-AB98-E84927268771}"/>
+          </ac:cxnSpMkLst>
+        </pc:cxnChg>
+        <pc:cxnChg chg="add mod">
+          <ac:chgData name="Yoshiharu Hamaguchi" userId="470e288704938fe9" providerId="LiveId" clId="{C43607F1-232B-44DB-B3B2-14DEC55E9315}" dt="2024-09-25T11:55:02.095" v="5109" actId="1035"/>
+          <ac:cxnSpMkLst>
+            <pc:docMk/>
+            <pc:sldMk cId="840589698" sldId="268"/>
+            <ac:cxnSpMk id="170" creationId="{04B8B0AB-0A41-F5D9-4C41-10446EE21735}"/>
+          </ac:cxnSpMkLst>
+        </pc:cxnChg>
+        <pc:cxnChg chg="add mod">
+          <ac:chgData name="Yoshiharu Hamaguchi" userId="470e288704938fe9" providerId="LiveId" clId="{C43607F1-232B-44DB-B3B2-14DEC55E9315}" dt="2024-09-25T11:55:02.095" v="5109" actId="1035"/>
+          <ac:cxnSpMkLst>
+            <pc:docMk/>
+            <pc:sldMk cId="840589698" sldId="268"/>
+            <ac:cxnSpMk id="175" creationId="{152005CE-C530-4496-5760-AA3F6AA1AEE2}"/>
+          </ac:cxnSpMkLst>
+        </pc:cxnChg>
+        <pc:cxnChg chg="add mod">
+          <ac:chgData name="Yoshiharu Hamaguchi" userId="470e288704938fe9" providerId="LiveId" clId="{C43607F1-232B-44DB-B3B2-14DEC55E9315}" dt="2024-09-25T13:28:04.391" v="6462" actId="208"/>
+          <ac:cxnSpMkLst>
+            <pc:docMk/>
+            <pc:sldMk cId="840589698" sldId="268"/>
+            <ac:cxnSpMk id="179" creationId="{7A4A3A67-DD95-558D-CEE2-3908D3A834BF}"/>
+          </ac:cxnSpMkLst>
+        </pc:cxnChg>
+        <pc:cxnChg chg="add mod">
+          <ac:chgData name="Yoshiharu Hamaguchi" userId="470e288704938fe9" providerId="LiveId" clId="{C43607F1-232B-44DB-B3B2-14DEC55E9315}" dt="2024-09-25T13:28:04.391" v="6462" actId="208"/>
+          <ac:cxnSpMkLst>
+            <pc:docMk/>
+            <pc:sldMk cId="840589698" sldId="268"/>
+            <ac:cxnSpMk id="182" creationId="{82CC0E9E-8ADB-EC6E-7027-6781BBB288FA}"/>
+          </ac:cxnSpMkLst>
+        </pc:cxnChg>
+      </pc:sldChg>
+      <pc:sldChg chg="addSp delSp modSp add del mod">
+        <pc:chgData name="Yoshiharu Hamaguchi" userId="470e288704938fe9" providerId="LiveId" clId="{C43607F1-232B-44DB-B3B2-14DEC55E9315}" dt="2024-09-25T15:43:33.374" v="6823" actId="47"/>
+        <pc:sldMkLst>
+          <pc:docMk/>
+          <pc:sldMk cId="2142688305" sldId="269"/>
+        </pc:sldMkLst>
+        <pc:spChg chg="mod">
+          <ac:chgData name="Yoshiharu Hamaguchi" userId="470e288704938fe9" providerId="LiveId" clId="{C43607F1-232B-44DB-B3B2-14DEC55E9315}" dt="2024-09-25T15:24:31.506" v="6651" actId="14100"/>
+          <ac:spMkLst>
+            <pc:docMk/>
+            <pc:sldMk cId="2142688305" sldId="269"/>
+            <ac:spMk id="2" creationId="{9C784ACA-9376-15C6-DD93-68B5D582FADA}"/>
+          </ac:spMkLst>
+        </pc:spChg>
+        <pc:spChg chg="mod">
+          <ac:chgData name="Yoshiharu Hamaguchi" userId="470e288704938fe9" providerId="LiveId" clId="{C43607F1-232B-44DB-B3B2-14DEC55E9315}" dt="2024-09-25T15:27:25.266" v="6758" actId="20577"/>
+          <ac:spMkLst>
+            <pc:docMk/>
+            <pc:sldMk cId="2142688305" sldId="269"/>
+            <ac:spMk id="4" creationId="{8C13C9CE-666C-02A7-9EAA-106F1B50AE66}"/>
+          </ac:spMkLst>
+        </pc:spChg>
+        <pc:spChg chg="del">
+          <ac:chgData name="Yoshiharu Hamaguchi" userId="470e288704938fe9" providerId="LiveId" clId="{C43607F1-232B-44DB-B3B2-14DEC55E9315}" dt="2024-09-25T15:24:43.991" v="6652" actId="478"/>
+          <ac:spMkLst>
+            <pc:docMk/>
+            <pc:sldMk cId="2142688305" sldId="269"/>
+            <ac:spMk id="5" creationId="{38525753-506C-CF9E-DF2A-0368D654E503}"/>
+          </ac:spMkLst>
+        </pc:spChg>
+        <pc:picChg chg="add mod">
+          <ac:chgData name="Yoshiharu Hamaguchi" userId="470e288704938fe9" providerId="LiveId" clId="{C43607F1-232B-44DB-B3B2-14DEC55E9315}" dt="2024-09-25T15:27:23.110" v="6757" actId="1076"/>
+          <ac:picMkLst>
+            <pc:docMk/>
+            <pc:sldMk cId="2142688305" sldId="269"/>
+            <ac:picMk id="6" creationId="{48B13ABD-A7EC-8A70-7FC9-8BE6883BF949}"/>
+          </ac:picMkLst>
+        </pc:picChg>
+      </pc:sldChg>
+      <pc:sldChg chg="modSp add mod">
+        <pc:chgData name="Yoshiharu Hamaguchi" userId="470e288704938fe9" providerId="LiveId" clId="{C43607F1-232B-44DB-B3B2-14DEC55E9315}" dt="2024-09-25T15:42:37.074" v="6816" actId="20577"/>
+        <pc:sldMkLst>
+          <pc:docMk/>
+          <pc:sldMk cId="1811470058" sldId="270"/>
+        </pc:sldMkLst>
+        <pc:spChg chg="mod">
+          <ac:chgData name="Yoshiharu Hamaguchi" userId="470e288704938fe9" providerId="LiveId" clId="{C43607F1-232B-44DB-B3B2-14DEC55E9315}" dt="2024-09-25T15:42:37.074" v="6816" actId="20577"/>
+          <ac:spMkLst>
+            <pc:docMk/>
+            <pc:sldMk cId="1811470058" sldId="270"/>
+            <ac:spMk id="24" creationId="{2C710E95-554D-F235-C3F1-BF13E1AA1068}"/>
+          </ac:spMkLst>
+        </pc:spChg>
+      </pc:sldChg>
+    </pc:docChg>
+  </pc:docChgLst>
+  <pc:docChgLst>
     <pc:chgData name="Yoshiharu Hamaguchi" userId="470e288704938fe9" providerId="LiveId" clId="{7FF04D8D-0E5C-4D85-91C7-38CEECAF421B}"/>
     <pc:docChg chg="delSld modSld">
       <pc:chgData name="Yoshiharu Hamaguchi" userId="470e288704938fe9" providerId="LiveId" clId="{7FF04D8D-0E5C-4D85-91C7-38CEECAF421B}" dt="2024-08-30T00:39:52.340" v="69" actId="47"/>
@@ -181,954 +1129,6 @@
       </pc:sldChg>
     </pc:docChg>
   </pc:docChgLst>
-  <pc:docChgLst>
-    <pc:chgData name="Yoshiharu Hamaguchi" userId="470e288704938fe9" providerId="LiveId" clId="{46C12E7F-E35C-42BF-B856-810C3AAE2138}"/>
-    <pc:docChg chg="custSel modSld">
-      <pc:chgData name="Yoshiharu Hamaguchi" userId="470e288704938fe9" providerId="LiveId" clId="{46C12E7F-E35C-42BF-B856-810C3AAE2138}" dt="2024-08-17T07:15:42.746" v="129" actId="20577"/>
-      <pc:docMkLst>
-        <pc:docMk/>
-      </pc:docMkLst>
-      <pc:sldChg chg="modSp mod">
-        <pc:chgData name="Yoshiharu Hamaguchi" userId="470e288704938fe9" providerId="LiveId" clId="{46C12E7F-E35C-42BF-B856-810C3AAE2138}" dt="2024-08-17T07:13:46.984" v="43" actId="20577"/>
-        <pc:sldMkLst>
-          <pc:docMk/>
-          <pc:sldMk cId="634982452" sldId="256"/>
-        </pc:sldMkLst>
-        <pc:spChg chg="mod">
-          <ac:chgData name="Yoshiharu Hamaguchi" userId="470e288704938fe9" providerId="LiveId" clId="{46C12E7F-E35C-42BF-B856-810C3AAE2138}" dt="2024-08-17T07:13:17.184" v="10" actId="20577"/>
-          <ac:spMkLst>
-            <pc:docMk/>
-            <pc:sldMk cId="634982452" sldId="256"/>
-            <ac:spMk id="2" creationId="{3F0D190A-A8DB-32F1-0D56-13F6D381B778}"/>
-          </ac:spMkLst>
-        </pc:spChg>
-        <pc:spChg chg="mod">
-          <ac:chgData name="Yoshiharu Hamaguchi" userId="470e288704938fe9" providerId="LiveId" clId="{46C12E7F-E35C-42BF-B856-810C3AAE2138}" dt="2024-08-17T07:13:46.984" v="43" actId="20577"/>
-          <ac:spMkLst>
-            <pc:docMk/>
-            <pc:sldMk cId="634982452" sldId="256"/>
-            <ac:spMk id="3" creationId="{BC817A74-920C-0926-7C76-24BA4993B9F3}"/>
-          </ac:spMkLst>
-        </pc:spChg>
-      </pc:sldChg>
-      <pc:sldChg chg="modSp mod">
-        <pc:chgData name="Yoshiharu Hamaguchi" userId="470e288704938fe9" providerId="LiveId" clId="{46C12E7F-E35C-42BF-B856-810C3AAE2138}" dt="2024-08-17T07:14:18.771" v="52" actId="20577"/>
-        <pc:sldMkLst>
-          <pc:docMk/>
-          <pc:sldMk cId="3586103662" sldId="259"/>
-        </pc:sldMkLst>
-        <pc:spChg chg="mod">
-          <ac:chgData name="Yoshiharu Hamaguchi" userId="470e288704938fe9" providerId="LiveId" clId="{46C12E7F-E35C-42BF-B856-810C3AAE2138}" dt="2024-08-17T07:14:18.771" v="52" actId="20577"/>
-          <ac:spMkLst>
-            <pc:docMk/>
-            <pc:sldMk cId="3586103662" sldId="259"/>
-            <ac:spMk id="3" creationId="{37025C41-8921-578C-16F8-6B5CF0A93AE0}"/>
-          </ac:spMkLst>
-        </pc:spChg>
-      </pc:sldChg>
-      <pc:sldChg chg="modSp mod">
-        <pc:chgData name="Yoshiharu Hamaguchi" userId="470e288704938fe9" providerId="LiveId" clId="{46C12E7F-E35C-42BF-B856-810C3AAE2138}" dt="2024-08-17T07:13:56.935" v="45" actId="27636"/>
-        <pc:sldMkLst>
-          <pc:docMk/>
-          <pc:sldMk cId="3422986759" sldId="260"/>
-        </pc:sldMkLst>
-        <pc:spChg chg="mod">
-          <ac:chgData name="Yoshiharu Hamaguchi" userId="470e288704938fe9" providerId="LiveId" clId="{46C12E7F-E35C-42BF-B856-810C3AAE2138}" dt="2024-08-17T07:13:56.935" v="45" actId="27636"/>
-          <ac:spMkLst>
-            <pc:docMk/>
-            <pc:sldMk cId="3422986759" sldId="260"/>
-            <ac:spMk id="3" creationId="{37025C41-8921-578C-16F8-6B5CF0A93AE0}"/>
-          </ac:spMkLst>
-        </pc:spChg>
-      </pc:sldChg>
-      <pc:sldChg chg="modSp mod">
-        <pc:chgData name="Yoshiharu Hamaguchi" userId="470e288704938fe9" providerId="LiveId" clId="{46C12E7F-E35C-42BF-B856-810C3AAE2138}" dt="2024-08-17T07:15:42.746" v="129" actId="20577"/>
-        <pc:sldMkLst>
-          <pc:docMk/>
-          <pc:sldMk cId="4019972730" sldId="262"/>
-        </pc:sldMkLst>
-        <pc:spChg chg="mod">
-          <ac:chgData name="Yoshiharu Hamaguchi" userId="470e288704938fe9" providerId="LiveId" clId="{46C12E7F-E35C-42BF-B856-810C3AAE2138}" dt="2024-08-17T07:15:42.746" v="129" actId="20577"/>
-          <ac:spMkLst>
-            <pc:docMk/>
-            <pc:sldMk cId="4019972730" sldId="262"/>
-            <ac:spMk id="3" creationId="{37025C41-8921-578C-16F8-6B5CF0A93AE0}"/>
-          </ac:spMkLst>
-        </pc:spChg>
-      </pc:sldChg>
-    </pc:docChg>
-  </pc:docChgLst>
-  <pc:docChgLst>
-    <pc:chgData name="Yoshiharu Hamaguchi" userId="470e288704938fe9" providerId="LiveId" clId="{C43607F1-232B-44DB-B3B2-14DEC55E9315}"/>
-    <pc:docChg chg="undo redo custSel addSld delSld modSld sldOrd">
-      <pc:chgData name="Yoshiharu Hamaguchi" userId="470e288704938fe9" providerId="LiveId" clId="{C43607F1-232B-44DB-B3B2-14DEC55E9315}" dt="2024-09-25T15:43:37.002" v="6824" actId="6549"/>
-      <pc:docMkLst>
-        <pc:docMk/>
-      </pc:docMkLst>
-      <pc:sldChg chg="modSp mod">
-        <pc:chgData name="Yoshiharu Hamaguchi" userId="470e288704938fe9" providerId="LiveId" clId="{C43607F1-232B-44DB-B3B2-14DEC55E9315}" dt="2024-09-25T15:42:09.206" v="6806" actId="20577"/>
-        <pc:sldMkLst>
-          <pc:docMk/>
-          <pc:sldMk cId="634982452" sldId="256"/>
-        </pc:sldMkLst>
-        <pc:spChg chg="mod">
-          <ac:chgData name="Yoshiharu Hamaguchi" userId="470e288704938fe9" providerId="LiveId" clId="{C43607F1-232B-44DB-B3B2-14DEC55E9315}" dt="2024-09-25T10:11:46.044" v="3377"/>
-          <ac:spMkLst>
-            <pc:docMk/>
-            <pc:sldMk cId="634982452" sldId="256"/>
-            <ac:spMk id="2" creationId="{3F0D190A-A8DB-32F1-0D56-13F6D381B778}"/>
-          </ac:spMkLst>
-        </pc:spChg>
-        <pc:spChg chg="mod">
-          <ac:chgData name="Yoshiharu Hamaguchi" userId="470e288704938fe9" providerId="LiveId" clId="{C43607F1-232B-44DB-B3B2-14DEC55E9315}" dt="2024-09-25T15:42:09.206" v="6806" actId="20577"/>
-          <ac:spMkLst>
-            <pc:docMk/>
-            <pc:sldMk cId="634982452" sldId="256"/>
-            <ac:spMk id="3" creationId="{BC817A74-920C-0926-7C76-24BA4993B9F3}"/>
-          </ac:spMkLst>
-        </pc:spChg>
-      </pc:sldChg>
-      <pc:sldChg chg="modSp mod ord">
-        <pc:chgData name="Yoshiharu Hamaguchi" userId="470e288704938fe9" providerId="LiveId" clId="{C43607F1-232B-44DB-B3B2-14DEC55E9315}" dt="2024-09-25T15:42:24.869" v="6815" actId="20577"/>
-        <pc:sldMkLst>
-          <pc:docMk/>
-          <pc:sldMk cId="4019972730" sldId="262"/>
-        </pc:sldMkLst>
-        <pc:spChg chg="mod">
-          <ac:chgData name="Yoshiharu Hamaguchi" userId="470e288704938fe9" providerId="LiveId" clId="{C43607F1-232B-44DB-B3B2-14DEC55E9315}" dt="2024-09-25T10:11:46.044" v="3377"/>
-          <ac:spMkLst>
-            <pc:docMk/>
-            <pc:sldMk cId="4019972730" sldId="262"/>
-            <ac:spMk id="2" creationId="{9C784ACA-9376-15C6-DD93-68B5D582FADA}"/>
-          </ac:spMkLst>
-        </pc:spChg>
-        <pc:spChg chg="mod">
-          <ac:chgData name="Yoshiharu Hamaguchi" userId="470e288704938fe9" providerId="LiveId" clId="{C43607F1-232B-44DB-B3B2-14DEC55E9315}" dt="2024-09-25T15:42:24.869" v="6815" actId="20577"/>
-          <ac:spMkLst>
-            <pc:docMk/>
-            <pc:sldMk cId="4019972730" sldId="262"/>
-            <ac:spMk id="3" creationId="{37025C41-8921-578C-16F8-6B5CF0A93AE0}"/>
-          </ac:spMkLst>
-        </pc:spChg>
-      </pc:sldChg>
-      <pc:sldChg chg="modSp add mod">
-        <pc:chgData name="Yoshiharu Hamaguchi" userId="470e288704938fe9" providerId="LiveId" clId="{C43607F1-232B-44DB-B3B2-14DEC55E9315}" dt="2024-09-25T15:42:58.235" v="6817" actId="20577"/>
-        <pc:sldMkLst>
-          <pc:docMk/>
-          <pc:sldMk cId="958570635" sldId="263"/>
-        </pc:sldMkLst>
-        <pc:spChg chg="mod">
-          <ac:chgData name="Yoshiharu Hamaguchi" userId="470e288704938fe9" providerId="LiveId" clId="{C43607F1-232B-44DB-B3B2-14DEC55E9315}" dt="2024-09-25T15:42:58.235" v="6817" actId="20577"/>
-          <ac:spMkLst>
-            <pc:docMk/>
-            <pc:sldMk cId="958570635" sldId="263"/>
-            <ac:spMk id="2" creationId="{9C784ACA-9376-15C6-DD93-68B5D582FADA}"/>
-          </ac:spMkLst>
-        </pc:spChg>
-        <pc:spChg chg="mod">
-          <ac:chgData name="Yoshiharu Hamaguchi" userId="470e288704938fe9" providerId="LiveId" clId="{C43607F1-232B-44DB-B3B2-14DEC55E9315}" dt="2024-09-25T11:59:29.129" v="5429" actId="20577"/>
-          <ac:spMkLst>
-            <pc:docMk/>
-            <pc:sldMk cId="958570635" sldId="263"/>
-            <ac:spMk id="3" creationId="{37025C41-8921-578C-16F8-6B5CF0A93AE0}"/>
-          </ac:spMkLst>
-        </pc:spChg>
-      </pc:sldChg>
-      <pc:sldChg chg="modSp add mod">
-        <pc:chgData name="Yoshiharu Hamaguchi" userId="470e288704938fe9" providerId="LiveId" clId="{C43607F1-232B-44DB-B3B2-14DEC55E9315}" dt="2024-09-25T15:43:37.002" v="6824" actId="6549"/>
-        <pc:sldMkLst>
-          <pc:docMk/>
-          <pc:sldMk cId="3365730422" sldId="264"/>
-        </pc:sldMkLst>
-        <pc:spChg chg="mod">
-          <ac:chgData name="Yoshiharu Hamaguchi" userId="470e288704938fe9" providerId="LiveId" clId="{C43607F1-232B-44DB-B3B2-14DEC55E9315}" dt="2024-09-25T10:11:46.044" v="3377"/>
-          <ac:spMkLst>
-            <pc:docMk/>
-            <pc:sldMk cId="3365730422" sldId="264"/>
-            <ac:spMk id="2" creationId="{9C784ACA-9376-15C6-DD93-68B5D582FADA}"/>
-          </ac:spMkLst>
-        </pc:spChg>
-        <pc:spChg chg="mod">
-          <ac:chgData name="Yoshiharu Hamaguchi" userId="470e288704938fe9" providerId="LiveId" clId="{C43607F1-232B-44DB-B3B2-14DEC55E9315}" dt="2024-09-25T15:43:37.002" v="6824" actId="6549"/>
-          <ac:spMkLst>
-            <pc:docMk/>
-            <pc:sldMk cId="3365730422" sldId="264"/>
-            <ac:spMk id="3" creationId="{37025C41-8921-578C-16F8-6B5CF0A93AE0}"/>
-          </ac:spMkLst>
-        </pc:spChg>
-      </pc:sldChg>
-      <pc:sldChg chg="modSp add mod">
-        <pc:chgData name="Yoshiharu Hamaguchi" userId="470e288704938fe9" providerId="LiveId" clId="{C43607F1-232B-44DB-B3B2-14DEC55E9315}" dt="2024-09-25T15:43:14.495" v="6821" actId="20577"/>
-        <pc:sldMkLst>
-          <pc:docMk/>
-          <pc:sldMk cId="3485624740" sldId="265"/>
-        </pc:sldMkLst>
-        <pc:spChg chg="mod">
-          <ac:chgData name="Yoshiharu Hamaguchi" userId="470e288704938fe9" providerId="LiveId" clId="{C43607F1-232B-44DB-B3B2-14DEC55E9315}" dt="2024-09-25T15:43:06.076" v="6818" actId="20577"/>
-          <ac:spMkLst>
-            <pc:docMk/>
-            <pc:sldMk cId="3485624740" sldId="265"/>
-            <ac:spMk id="2" creationId="{9C784ACA-9376-15C6-DD93-68B5D582FADA}"/>
-          </ac:spMkLst>
-        </pc:spChg>
-        <pc:spChg chg="mod">
-          <ac:chgData name="Yoshiharu Hamaguchi" userId="470e288704938fe9" providerId="LiveId" clId="{C43607F1-232B-44DB-B3B2-14DEC55E9315}" dt="2024-09-25T15:43:14.495" v="6821" actId="20577"/>
-          <ac:spMkLst>
-            <pc:docMk/>
-            <pc:sldMk cId="3485624740" sldId="265"/>
-            <ac:spMk id="3" creationId="{37025C41-8921-578C-16F8-6B5CF0A93AE0}"/>
-          </ac:spMkLst>
-        </pc:spChg>
-      </pc:sldChg>
-      <pc:sldChg chg="addSp delSp modSp add del mod ord">
-        <pc:chgData name="Yoshiharu Hamaguchi" userId="470e288704938fe9" providerId="LiveId" clId="{C43607F1-232B-44DB-B3B2-14DEC55E9315}" dt="2024-09-25T15:43:33.374" v="6823" actId="47"/>
-        <pc:sldMkLst>
-          <pc:docMk/>
-          <pc:sldMk cId="3544669301" sldId="266"/>
-        </pc:sldMkLst>
-        <pc:spChg chg="mod">
-          <ac:chgData name="Yoshiharu Hamaguchi" userId="470e288704938fe9" providerId="LiveId" clId="{C43607F1-232B-44DB-B3B2-14DEC55E9315}" dt="2024-09-25T13:30:45.185" v="6550" actId="20577"/>
-          <ac:spMkLst>
-            <pc:docMk/>
-            <pc:sldMk cId="3544669301" sldId="266"/>
-            <ac:spMk id="2" creationId="{9C784ACA-9376-15C6-DD93-68B5D582FADA}"/>
-          </ac:spMkLst>
-        </pc:spChg>
-        <pc:spChg chg="del mod">
-          <ac:chgData name="Yoshiharu Hamaguchi" userId="470e288704938fe9" providerId="LiveId" clId="{C43607F1-232B-44DB-B3B2-14DEC55E9315}" dt="2024-09-25T12:13:58.063" v="6127" actId="478"/>
-          <ac:spMkLst>
-            <pc:docMk/>
-            <pc:sldMk cId="3544669301" sldId="266"/>
-            <ac:spMk id="3" creationId="{37025C41-8921-578C-16F8-6B5CF0A93AE0}"/>
-          </ac:spMkLst>
-        </pc:spChg>
-        <pc:spChg chg="add mod">
-          <ac:chgData name="Yoshiharu Hamaguchi" userId="470e288704938fe9" providerId="LiveId" clId="{C43607F1-232B-44DB-B3B2-14DEC55E9315}" dt="2024-09-25T15:24:02.544" v="6637" actId="20577"/>
-          <ac:spMkLst>
-            <pc:docMk/>
-            <pc:sldMk cId="3544669301" sldId="266"/>
-            <ac:spMk id="4" creationId="{8C13C9CE-666C-02A7-9EAA-106F1B50AE66}"/>
-          </ac:spMkLst>
-        </pc:spChg>
-        <pc:spChg chg="add mod">
-          <ac:chgData name="Yoshiharu Hamaguchi" userId="470e288704938fe9" providerId="LiveId" clId="{C43607F1-232B-44DB-B3B2-14DEC55E9315}" dt="2024-09-25T15:23:37.841" v="6553" actId="1076"/>
-          <ac:spMkLst>
-            <pc:docMk/>
-            <pc:sldMk cId="3544669301" sldId="266"/>
-            <ac:spMk id="5" creationId="{38525753-506C-CF9E-DF2A-0368D654E503}"/>
-          </ac:spMkLst>
-        </pc:spChg>
-        <pc:graphicFrameChg chg="add del mod">
-          <ac:chgData name="Yoshiharu Hamaguchi" userId="470e288704938fe9" providerId="LiveId" clId="{C43607F1-232B-44DB-B3B2-14DEC55E9315}" dt="2024-09-25T09:11:35.706" v="3118" actId="478"/>
-          <ac:graphicFrameMkLst>
-            <pc:docMk/>
-            <pc:sldMk cId="3544669301" sldId="266"/>
-            <ac:graphicFrameMk id="4" creationId="{9638860F-7C2B-CB75-3633-23A88AD1CFFF}"/>
-          </ac:graphicFrameMkLst>
-        </pc:graphicFrameChg>
-      </pc:sldChg>
-      <pc:sldChg chg="addSp delSp modSp add mod">
-        <pc:chgData name="Yoshiharu Hamaguchi" userId="470e288704938fe9" providerId="LiveId" clId="{C43607F1-232B-44DB-B3B2-14DEC55E9315}" dt="2024-09-25T15:43:23.111" v="6822" actId="20577"/>
-        <pc:sldMkLst>
-          <pc:docMk/>
-          <pc:sldMk cId="768576187" sldId="267"/>
-        </pc:sldMkLst>
-        <pc:spChg chg="mod">
-          <ac:chgData name="Yoshiharu Hamaguchi" userId="470e288704938fe9" providerId="LiveId" clId="{C43607F1-232B-44DB-B3B2-14DEC55E9315}" dt="2024-09-25T15:43:23.111" v="6822" actId="20577"/>
-          <ac:spMkLst>
-            <pc:docMk/>
-            <pc:sldMk cId="768576187" sldId="267"/>
-            <ac:spMk id="2" creationId="{9C784ACA-9376-15C6-DD93-68B5D582FADA}"/>
-          </ac:spMkLst>
-        </pc:spChg>
-        <pc:spChg chg="mod">
-          <ac:chgData name="Yoshiharu Hamaguchi" userId="470e288704938fe9" providerId="LiveId" clId="{C43607F1-232B-44DB-B3B2-14DEC55E9315}" dt="2024-09-25T12:39:33.816" v="6418" actId="20577"/>
-          <ac:spMkLst>
-            <pc:docMk/>
-            <pc:sldMk cId="768576187" sldId="267"/>
-            <ac:spMk id="3" creationId="{37025C41-8921-578C-16F8-6B5CF0A93AE0}"/>
-          </ac:spMkLst>
-        </pc:spChg>
-        <pc:graphicFrameChg chg="add mod">
-          <ac:chgData name="Yoshiharu Hamaguchi" userId="470e288704938fe9" providerId="LiveId" clId="{C43607F1-232B-44DB-B3B2-14DEC55E9315}" dt="2024-09-25T12:12:56.408" v="6045" actId="1076"/>
-          <ac:graphicFrameMkLst>
-            <pc:docMk/>
-            <pc:sldMk cId="768576187" sldId="267"/>
-            <ac:graphicFrameMk id="4" creationId="{4E5D5511-B581-66FB-A2EC-FFB9111D8C73}"/>
-          </ac:graphicFrameMkLst>
-        </pc:graphicFrameChg>
-        <pc:graphicFrameChg chg="del">
-          <ac:chgData name="Yoshiharu Hamaguchi" userId="470e288704938fe9" providerId="LiveId" clId="{C43607F1-232B-44DB-B3B2-14DEC55E9315}" dt="2024-09-25T09:09:05.412" v="2871" actId="478"/>
-          <ac:graphicFrameMkLst>
-            <pc:docMk/>
-            <pc:sldMk cId="768576187" sldId="267"/>
-            <ac:graphicFrameMk id="4" creationId="{9638860F-7C2B-CB75-3633-23A88AD1CFFF}"/>
-          </ac:graphicFrameMkLst>
-        </pc:graphicFrameChg>
-      </pc:sldChg>
-      <pc:sldChg chg="addSp delSp modSp add del mod">
-        <pc:chgData name="Yoshiharu Hamaguchi" userId="470e288704938fe9" providerId="LiveId" clId="{C43607F1-232B-44DB-B3B2-14DEC55E9315}" dt="2024-09-25T15:41:14.757" v="6783" actId="47"/>
-        <pc:sldMkLst>
-          <pc:docMk/>
-          <pc:sldMk cId="840589698" sldId="268"/>
-        </pc:sldMkLst>
-        <pc:spChg chg="mod">
-          <ac:chgData name="Yoshiharu Hamaguchi" userId="470e288704938fe9" providerId="LiveId" clId="{C43607F1-232B-44DB-B3B2-14DEC55E9315}" dt="2024-09-25T11:54:23.312" v="5068" actId="20577"/>
-          <ac:spMkLst>
-            <pc:docMk/>
-            <pc:sldMk cId="840589698" sldId="268"/>
-            <ac:spMk id="2" creationId="{9C784ACA-9376-15C6-DD93-68B5D582FADA}"/>
-          </ac:spMkLst>
-        </pc:spChg>
-        <pc:spChg chg="mod">
-          <ac:chgData name="Yoshiharu Hamaguchi" userId="470e288704938fe9" providerId="LiveId" clId="{C43607F1-232B-44DB-B3B2-14DEC55E9315}" dt="2024-09-25T11:55:02.095" v="5109" actId="1035"/>
-          <ac:spMkLst>
-            <pc:docMk/>
-            <pc:sldMk cId="840589698" sldId="268"/>
-            <ac:spMk id="3" creationId="{37025C41-8921-578C-16F8-6B5CF0A93AE0}"/>
-          </ac:spMkLst>
-        </pc:spChg>
-        <pc:spChg chg="add del mod">
-          <ac:chgData name="Yoshiharu Hamaguchi" userId="470e288704938fe9" providerId="LiveId" clId="{C43607F1-232B-44DB-B3B2-14DEC55E9315}" dt="2024-09-25T10:16:39.785" v="3447" actId="11529"/>
-          <ac:spMkLst>
-            <pc:docMk/>
-            <pc:sldMk cId="840589698" sldId="268"/>
-            <ac:spMk id="4" creationId="{F98FC884-FBB8-61AD-34FB-0D85D813F28B}"/>
-          </ac:spMkLst>
-        </pc:spChg>
-        <pc:spChg chg="add mod">
-          <ac:chgData name="Yoshiharu Hamaguchi" userId="470e288704938fe9" providerId="LiveId" clId="{C43607F1-232B-44DB-B3B2-14DEC55E9315}" dt="2024-09-25T10:16:39.267" v="3446" actId="571"/>
-          <ac:spMkLst>
-            <pc:docMk/>
-            <pc:sldMk cId="840589698" sldId="268"/>
-            <ac:spMk id="5" creationId="{F23FD391-2473-6A83-F034-27A86E8878C2}"/>
-          </ac:spMkLst>
-        </pc:spChg>
-        <pc:spChg chg="add del">
-          <ac:chgData name="Yoshiharu Hamaguchi" userId="470e288704938fe9" providerId="LiveId" clId="{C43607F1-232B-44DB-B3B2-14DEC55E9315}" dt="2024-09-25T10:18:36.849" v="3472" actId="478"/>
-          <ac:spMkLst>
-            <pc:docMk/>
-            <pc:sldMk cId="840589698" sldId="268"/>
-            <ac:spMk id="12" creationId="{5320D42A-23DA-4C62-811E-03B9E5D4BC45}"/>
-          </ac:spMkLst>
-        </pc:spChg>
-        <pc:spChg chg="add mod">
-          <ac:chgData name="Yoshiharu Hamaguchi" userId="470e288704938fe9" providerId="LiveId" clId="{C43607F1-232B-44DB-B3B2-14DEC55E9315}" dt="2024-09-25T12:00:41.153" v="5465" actId="20577"/>
-          <ac:spMkLst>
-            <pc:docMk/>
-            <pc:sldMk cId="840589698" sldId="268"/>
-            <ac:spMk id="17" creationId="{22EFD490-063C-E600-DC74-E61C4AD29849}"/>
-          </ac:spMkLst>
-        </pc:spChg>
-        <pc:spChg chg="add del mod">
-          <ac:chgData name="Yoshiharu Hamaguchi" userId="470e288704938fe9" providerId="LiveId" clId="{C43607F1-232B-44DB-B3B2-14DEC55E9315}" dt="2024-09-25T10:21:45.687" v="3627"/>
-          <ac:spMkLst>
-            <pc:docMk/>
-            <pc:sldMk cId="840589698" sldId="268"/>
-            <ac:spMk id="18" creationId="{AFC52DAA-C20B-D63E-784B-8FAFBC832FAE}"/>
-          </ac:spMkLst>
-        </pc:spChg>
-        <pc:spChg chg="add mod">
-          <ac:chgData name="Yoshiharu Hamaguchi" userId="470e288704938fe9" providerId="LiveId" clId="{C43607F1-232B-44DB-B3B2-14DEC55E9315}" dt="2024-09-25T11:55:02.095" v="5109" actId="1035"/>
-          <ac:spMkLst>
-            <pc:docMk/>
-            <pc:sldMk cId="840589698" sldId="268"/>
-            <ac:spMk id="19" creationId="{2CDCB588-1E89-B1B4-BB6B-210B5ECD1361}"/>
-          </ac:spMkLst>
-        </pc:spChg>
-        <pc:spChg chg="add mod">
-          <ac:chgData name="Yoshiharu Hamaguchi" userId="470e288704938fe9" providerId="LiveId" clId="{C43607F1-232B-44DB-B3B2-14DEC55E9315}" dt="2024-09-25T11:55:02.095" v="5109" actId="1035"/>
-          <ac:spMkLst>
-            <pc:docMk/>
-            <pc:sldMk cId="840589698" sldId="268"/>
-            <ac:spMk id="20" creationId="{5D996A43-DC64-4070-A3C0-8AEBA9493CE6}"/>
-          </ac:spMkLst>
-        </pc:spChg>
-        <pc:spChg chg="add mod">
-          <ac:chgData name="Yoshiharu Hamaguchi" userId="470e288704938fe9" providerId="LiveId" clId="{C43607F1-232B-44DB-B3B2-14DEC55E9315}" dt="2024-09-25T12:01:51.040" v="5503" actId="20577"/>
-          <ac:spMkLst>
-            <pc:docMk/>
-            <pc:sldMk cId="840589698" sldId="268"/>
-            <ac:spMk id="21" creationId="{7EB19867-148A-D7FC-9274-4234BFD3440B}"/>
-          </ac:spMkLst>
-        </pc:spChg>
-        <pc:spChg chg="add mod">
-          <ac:chgData name="Yoshiharu Hamaguchi" userId="470e288704938fe9" providerId="LiveId" clId="{C43607F1-232B-44DB-B3B2-14DEC55E9315}" dt="2024-09-25T10:22:00.581" v="3631" actId="571"/>
-          <ac:spMkLst>
-            <pc:docMk/>
-            <pc:sldMk cId="840589698" sldId="268"/>
-            <ac:spMk id="22" creationId="{CBA24C83-4831-1386-386F-530CF522B95C}"/>
-          </ac:spMkLst>
-        </pc:spChg>
-        <pc:spChg chg="add mod">
-          <ac:chgData name="Yoshiharu Hamaguchi" userId="470e288704938fe9" providerId="LiveId" clId="{C43607F1-232B-44DB-B3B2-14DEC55E9315}" dt="2024-09-25T10:22:00.581" v="3631" actId="571"/>
-          <ac:spMkLst>
-            <pc:docMk/>
-            <pc:sldMk cId="840589698" sldId="268"/>
-            <ac:spMk id="23" creationId="{0D782016-83C1-6806-9341-108657EA9BA8}"/>
-          </ac:spMkLst>
-        </pc:spChg>
-        <pc:spChg chg="add mod ord">
-          <ac:chgData name="Yoshiharu Hamaguchi" userId="470e288704938fe9" providerId="LiveId" clId="{C43607F1-232B-44DB-B3B2-14DEC55E9315}" dt="2024-09-25T11:55:02.095" v="5109" actId="1035"/>
-          <ac:spMkLst>
-            <pc:docMk/>
-            <pc:sldMk cId="840589698" sldId="268"/>
-            <ac:spMk id="24" creationId="{2C710E95-554D-F235-C3F1-BF13E1AA1068}"/>
-          </ac:spMkLst>
-        </pc:spChg>
-        <pc:spChg chg="add mod ord">
-          <ac:chgData name="Yoshiharu Hamaguchi" userId="470e288704938fe9" providerId="LiveId" clId="{C43607F1-232B-44DB-B3B2-14DEC55E9315}" dt="2024-09-25T11:55:02.095" v="5109" actId="1035"/>
-          <ac:spMkLst>
-            <pc:docMk/>
-            <pc:sldMk cId="840589698" sldId="268"/>
-            <ac:spMk id="25" creationId="{432FD002-C3EC-95AB-E364-BC60A7440B0A}"/>
-          </ac:spMkLst>
-        </pc:spChg>
-        <pc:spChg chg="add mod ord">
-          <ac:chgData name="Yoshiharu Hamaguchi" userId="470e288704938fe9" providerId="LiveId" clId="{C43607F1-232B-44DB-B3B2-14DEC55E9315}" dt="2024-09-25T11:55:02.095" v="5109" actId="1035"/>
-          <ac:spMkLst>
-            <pc:docMk/>
-            <pc:sldMk cId="840589698" sldId="268"/>
-            <ac:spMk id="26" creationId="{0A5DCF7B-D5B4-2BE2-5871-8EED0BA9AE2C}"/>
-          </ac:spMkLst>
-        </pc:spChg>
-        <pc:spChg chg="add mod">
-          <ac:chgData name="Yoshiharu Hamaguchi" userId="470e288704938fe9" providerId="LiveId" clId="{C43607F1-232B-44DB-B3B2-14DEC55E9315}" dt="2024-09-25T12:03:08.078" v="5525" actId="1036"/>
-          <ac:spMkLst>
-            <pc:docMk/>
-            <pc:sldMk cId="840589698" sldId="268"/>
-            <ac:spMk id="27" creationId="{D7F52068-5699-1CBA-7FBA-D813809E2F1F}"/>
-          </ac:spMkLst>
-        </pc:spChg>
-        <pc:spChg chg="add mod">
-          <ac:chgData name="Yoshiharu Hamaguchi" userId="470e288704938fe9" providerId="LiveId" clId="{C43607F1-232B-44DB-B3B2-14DEC55E9315}" dt="2024-09-25T10:27:34.883" v="3851" actId="571"/>
-          <ac:spMkLst>
-            <pc:docMk/>
-            <pc:sldMk cId="840589698" sldId="268"/>
-            <ac:spMk id="28" creationId="{FD64C395-4E8A-6520-A2FE-4A7B5009B0AB}"/>
-          </ac:spMkLst>
-        </pc:spChg>
-        <pc:spChg chg="add mod">
-          <ac:chgData name="Yoshiharu Hamaguchi" userId="470e288704938fe9" providerId="LiveId" clId="{C43607F1-232B-44DB-B3B2-14DEC55E9315}" dt="2024-09-25T10:27:38.841" v="3853" actId="571"/>
-          <ac:spMkLst>
-            <pc:docMk/>
-            <pc:sldMk cId="840589698" sldId="268"/>
-            <ac:spMk id="29" creationId="{8D074A2A-D5C9-BBC7-E92D-C9565B37A9E9}"/>
-          </ac:spMkLst>
-        </pc:spChg>
-        <pc:spChg chg="add mod">
-          <ac:chgData name="Yoshiharu Hamaguchi" userId="470e288704938fe9" providerId="LiveId" clId="{C43607F1-232B-44DB-B3B2-14DEC55E9315}" dt="2024-09-25T11:55:02.095" v="5109" actId="1035"/>
-          <ac:spMkLst>
-            <pc:docMk/>
-            <pc:sldMk cId="840589698" sldId="268"/>
-            <ac:spMk id="30" creationId="{9F8A6BA6-9C05-8916-B855-7146EEBA1167}"/>
-          </ac:spMkLst>
-        </pc:spChg>
-        <pc:spChg chg="add mod">
-          <ac:chgData name="Yoshiharu Hamaguchi" userId="470e288704938fe9" providerId="LiveId" clId="{C43607F1-232B-44DB-B3B2-14DEC55E9315}" dt="2024-09-25T11:55:02.095" v="5109" actId="1035"/>
-          <ac:spMkLst>
-            <pc:docMk/>
-            <pc:sldMk cId="840589698" sldId="268"/>
-            <ac:spMk id="31" creationId="{84235BB5-BE18-15D2-8BB3-E9CB549D6AB3}"/>
-          </ac:spMkLst>
-        </pc:spChg>
-        <pc:spChg chg="add mod">
-          <ac:chgData name="Yoshiharu Hamaguchi" userId="470e288704938fe9" providerId="LiveId" clId="{C43607F1-232B-44DB-B3B2-14DEC55E9315}" dt="2024-09-25T11:55:02.095" v="5109" actId="1035"/>
-          <ac:spMkLst>
-            <pc:docMk/>
-            <pc:sldMk cId="840589698" sldId="268"/>
-            <ac:spMk id="32" creationId="{CD126C2D-904F-6F62-E142-CA8F1BBD0251}"/>
-          </ac:spMkLst>
-        </pc:spChg>
-        <pc:spChg chg="add mod">
-          <ac:chgData name="Yoshiharu Hamaguchi" userId="470e288704938fe9" providerId="LiveId" clId="{C43607F1-232B-44DB-B3B2-14DEC55E9315}" dt="2024-09-25T11:55:02.095" v="5109" actId="1035"/>
-          <ac:spMkLst>
-            <pc:docMk/>
-            <pc:sldMk cId="840589698" sldId="268"/>
-            <ac:spMk id="33" creationId="{0FB338FD-35EF-30D7-06A9-7A1B992B2830}"/>
-          </ac:spMkLst>
-        </pc:spChg>
-        <pc:spChg chg="add del mod">
-          <ac:chgData name="Yoshiharu Hamaguchi" userId="470e288704938fe9" providerId="LiveId" clId="{C43607F1-232B-44DB-B3B2-14DEC55E9315}" dt="2024-09-25T10:35:09.999" v="4180" actId="478"/>
-          <ac:spMkLst>
-            <pc:docMk/>
-            <pc:sldMk cId="840589698" sldId="268"/>
-            <ac:spMk id="34" creationId="{A50A472D-4099-8DAF-24F2-AF418F2F9C79}"/>
-          </ac:spMkLst>
-        </pc:spChg>
-        <pc:spChg chg="add mod">
-          <ac:chgData name="Yoshiharu Hamaguchi" userId="470e288704938fe9" providerId="LiveId" clId="{C43607F1-232B-44DB-B3B2-14DEC55E9315}" dt="2024-09-25T11:55:02.095" v="5109" actId="1035"/>
-          <ac:spMkLst>
-            <pc:docMk/>
-            <pc:sldMk cId="840589698" sldId="268"/>
-            <ac:spMk id="35" creationId="{1AFFE9F5-AE2D-EBB6-D84B-C52DD42E357B}"/>
-          </ac:spMkLst>
-        </pc:spChg>
-        <pc:spChg chg="add mod">
-          <ac:chgData name="Yoshiharu Hamaguchi" userId="470e288704938fe9" providerId="LiveId" clId="{C43607F1-232B-44DB-B3B2-14DEC55E9315}" dt="2024-09-25T10:39:29.891" v="4299" actId="571"/>
-          <ac:spMkLst>
-            <pc:docMk/>
-            <pc:sldMk cId="840589698" sldId="268"/>
-            <ac:spMk id="36" creationId="{24F56B13-3AC6-7FDD-8B46-EE30294A3D96}"/>
-          </ac:spMkLst>
-        </pc:spChg>
-        <pc:spChg chg="add mod ord">
-          <ac:chgData name="Yoshiharu Hamaguchi" userId="470e288704938fe9" providerId="LiveId" clId="{C43607F1-232B-44DB-B3B2-14DEC55E9315}" dt="2024-09-25T11:55:02.095" v="5109" actId="1035"/>
-          <ac:spMkLst>
-            <pc:docMk/>
-            <pc:sldMk cId="840589698" sldId="268"/>
-            <ac:spMk id="37" creationId="{D1058EA4-8932-1FDF-0C0E-3BD94FD33D65}"/>
-          </ac:spMkLst>
-        </pc:spChg>
-        <pc:spChg chg="add mod ord">
-          <ac:chgData name="Yoshiharu Hamaguchi" userId="470e288704938fe9" providerId="LiveId" clId="{C43607F1-232B-44DB-B3B2-14DEC55E9315}" dt="2024-09-25T11:55:02.095" v="5109" actId="1035"/>
-          <ac:spMkLst>
-            <pc:docMk/>
-            <pc:sldMk cId="840589698" sldId="268"/>
-            <ac:spMk id="38" creationId="{1A3E6AA3-18D3-7A9B-F0B1-B7633BF22430}"/>
-          </ac:spMkLst>
-        </pc:spChg>
-        <pc:spChg chg="add mod ord">
-          <ac:chgData name="Yoshiharu Hamaguchi" userId="470e288704938fe9" providerId="LiveId" clId="{C43607F1-232B-44DB-B3B2-14DEC55E9315}" dt="2024-09-25T11:55:02.095" v="5109" actId="1035"/>
-          <ac:spMkLst>
-            <pc:docMk/>
-            <pc:sldMk cId="840589698" sldId="268"/>
-            <ac:spMk id="39" creationId="{8A7149DE-6BB3-5177-C779-82DBB0881054}"/>
-          </ac:spMkLst>
-        </pc:spChg>
-        <pc:spChg chg="add mod">
-          <ac:chgData name="Yoshiharu Hamaguchi" userId="470e288704938fe9" providerId="LiveId" clId="{C43607F1-232B-44DB-B3B2-14DEC55E9315}" dt="2024-09-25T11:55:02.095" v="5109" actId="1035"/>
-          <ac:spMkLst>
-            <pc:docMk/>
-            <pc:sldMk cId="840589698" sldId="268"/>
-            <ac:spMk id="40" creationId="{AE3EDBDD-CC31-46D4-A001-B6C397E7D5A7}"/>
-          </ac:spMkLst>
-        </pc:spChg>
-        <pc:spChg chg="add mod">
-          <ac:chgData name="Yoshiharu Hamaguchi" userId="470e288704938fe9" providerId="LiveId" clId="{C43607F1-232B-44DB-B3B2-14DEC55E9315}" dt="2024-09-25T12:02:19.942" v="5505" actId="20577"/>
-          <ac:spMkLst>
-            <pc:docMk/>
-            <pc:sldMk cId="840589698" sldId="268"/>
-            <ac:spMk id="41" creationId="{78EB841D-7EEE-856E-2816-A546A25A6747}"/>
-          </ac:spMkLst>
-        </pc:spChg>
-        <pc:spChg chg="add mod">
-          <ac:chgData name="Yoshiharu Hamaguchi" userId="470e288704938fe9" providerId="LiveId" clId="{C43607F1-232B-44DB-B3B2-14DEC55E9315}" dt="2024-09-25T11:55:02.095" v="5109" actId="1035"/>
-          <ac:spMkLst>
-            <pc:docMk/>
-            <pc:sldMk cId="840589698" sldId="268"/>
-            <ac:spMk id="42" creationId="{25617D89-2A2A-DD7D-7316-1D4B0FFFD10C}"/>
-          </ac:spMkLst>
-        </pc:spChg>
-        <pc:spChg chg="add mod">
-          <ac:chgData name="Yoshiharu Hamaguchi" userId="470e288704938fe9" providerId="LiveId" clId="{C43607F1-232B-44DB-B3B2-14DEC55E9315}" dt="2024-09-25T11:55:02.095" v="5109" actId="1035"/>
-          <ac:spMkLst>
-            <pc:docMk/>
-            <pc:sldMk cId="840589698" sldId="268"/>
-            <ac:spMk id="43" creationId="{5FCB99EE-0845-55B5-25FB-9528EA5E62DB}"/>
-          </ac:spMkLst>
-        </pc:spChg>
-        <pc:spChg chg="add del">
-          <ac:chgData name="Yoshiharu Hamaguchi" userId="470e288704938fe9" providerId="LiveId" clId="{C43607F1-232B-44DB-B3B2-14DEC55E9315}" dt="2024-09-25T11:27:52.577" v="4545" actId="11529"/>
-          <ac:spMkLst>
-            <pc:docMk/>
-            <pc:sldMk cId="840589698" sldId="268"/>
-            <ac:spMk id="46" creationId="{864648D8-4C7D-49CB-AC03-A530324A6D1F}"/>
-          </ac:spMkLst>
-        </pc:spChg>
-        <pc:spChg chg="add mod">
-          <ac:chgData name="Yoshiharu Hamaguchi" userId="470e288704938fe9" providerId="LiveId" clId="{C43607F1-232B-44DB-B3B2-14DEC55E9315}" dt="2024-09-25T12:22:51.936" v="6363" actId="1076"/>
-          <ac:spMkLst>
-            <pc:docMk/>
-            <pc:sldMk cId="840589698" sldId="268"/>
-            <ac:spMk id="53" creationId="{2EBDE60C-B3C7-8BCA-38EB-2B2EE296631D}"/>
-          </ac:spMkLst>
-        </pc:spChg>
-        <pc:spChg chg="add mod">
-          <ac:chgData name="Yoshiharu Hamaguchi" userId="470e288704938fe9" providerId="LiveId" clId="{C43607F1-232B-44DB-B3B2-14DEC55E9315}" dt="2024-09-25T11:29:12.246" v="4591" actId="571"/>
-          <ac:spMkLst>
-            <pc:docMk/>
-            <pc:sldMk cId="840589698" sldId="268"/>
-            <ac:spMk id="54" creationId="{64213D1F-62E0-6FE2-8DD0-98A0F7965A20}"/>
-          </ac:spMkLst>
-        </pc:spChg>
-        <pc:spChg chg="add mod">
-          <ac:chgData name="Yoshiharu Hamaguchi" userId="470e288704938fe9" providerId="LiveId" clId="{C43607F1-232B-44DB-B3B2-14DEC55E9315}" dt="2024-09-25T11:30:21.518" v="4611" actId="571"/>
-          <ac:spMkLst>
-            <pc:docMk/>
-            <pc:sldMk cId="840589698" sldId="268"/>
-            <ac:spMk id="69" creationId="{87F80CD8-AD9D-76E0-D20C-888BEB7DBF63}"/>
-          </ac:spMkLst>
-        </pc:spChg>
-        <pc:spChg chg="add mod">
-          <ac:chgData name="Yoshiharu Hamaguchi" userId="470e288704938fe9" providerId="LiveId" clId="{C43607F1-232B-44DB-B3B2-14DEC55E9315}" dt="2024-09-25T11:55:02.095" v="5109" actId="1035"/>
-          <ac:spMkLst>
-            <pc:docMk/>
-            <pc:sldMk cId="840589698" sldId="268"/>
-            <ac:spMk id="72" creationId="{741FC192-317D-477E-05E4-6AE0AEEE4091}"/>
-          </ac:spMkLst>
-        </pc:spChg>
-        <pc:spChg chg="add del mod ord">
-          <ac:chgData name="Yoshiharu Hamaguchi" userId="470e288704938fe9" providerId="LiveId" clId="{C43607F1-232B-44DB-B3B2-14DEC55E9315}" dt="2024-09-25T11:42:15.199" v="4772" actId="478"/>
-          <ac:spMkLst>
-            <pc:docMk/>
-            <pc:sldMk cId="840589698" sldId="268"/>
-            <ac:spMk id="73" creationId="{F290F820-E77D-22D6-2914-B8FF9F15771A}"/>
-          </ac:spMkLst>
-        </pc:spChg>
-        <pc:spChg chg="add del mod ord">
-          <ac:chgData name="Yoshiharu Hamaguchi" userId="470e288704938fe9" providerId="LiveId" clId="{C43607F1-232B-44DB-B3B2-14DEC55E9315}" dt="2024-09-25T11:42:39.516" v="4783" actId="478"/>
-          <ac:spMkLst>
-            <pc:docMk/>
-            <pc:sldMk cId="840589698" sldId="268"/>
-            <ac:spMk id="74" creationId="{773FC1F2-A6BB-000C-C4C6-25ED96C57065}"/>
-          </ac:spMkLst>
-        </pc:spChg>
-        <pc:spChg chg="add del mod ord">
-          <ac:chgData name="Yoshiharu Hamaguchi" userId="470e288704938fe9" providerId="LiveId" clId="{C43607F1-232B-44DB-B3B2-14DEC55E9315}" dt="2024-09-25T11:42:38.906" v="4782" actId="478"/>
-          <ac:spMkLst>
-            <pc:docMk/>
-            <pc:sldMk cId="840589698" sldId="268"/>
-            <ac:spMk id="76" creationId="{579EA042-E61D-672A-3ED1-E044253656A2}"/>
-          </ac:spMkLst>
-        </pc:spChg>
-        <pc:spChg chg="add mod ord">
-          <ac:chgData name="Yoshiharu Hamaguchi" userId="470e288704938fe9" providerId="LiveId" clId="{C43607F1-232B-44DB-B3B2-14DEC55E9315}" dt="2024-09-25T13:28:46.984" v="6464" actId="207"/>
-          <ac:spMkLst>
-            <pc:docMk/>
-            <pc:sldMk cId="840589698" sldId="268"/>
-            <ac:spMk id="77" creationId="{A8393CBC-1EA9-35DD-1457-F7D76951A781}"/>
-          </ac:spMkLst>
-        </pc:spChg>
-        <pc:spChg chg="add mod">
-          <ac:chgData name="Yoshiharu Hamaguchi" userId="470e288704938fe9" providerId="LiveId" clId="{C43607F1-232B-44DB-B3B2-14DEC55E9315}" dt="2024-09-25T11:55:02.095" v="5109" actId="1035"/>
-          <ac:spMkLst>
-            <pc:docMk/>
-            <pc:sldMk cId="840589698" sldId="268"/>
-            <ac:spMk id="83" creationId="{CCD52B30-82F7-87C0-989A-283F3DA60F6E}"/>
-          </ac:spMkLst>
-        </pc:spChg>
-        <pc:spChg chg="add mod">
-          <ac:chgData name="Yoshiharu Hamaguchi" userId="470e288704938fe9" providerId="LiveId" clId="{C43607F1-232B-44DB-B3B2-14DEC55E9315}" dt="2024-09-25T13:28:31.859" v="6463" actId="13822"/>
-          <ac:spMkLst>
-            <pc:docMk/>
-            <pc:sldMk cId="840589698" sldId="268"/>
-            <ac:spMk id="84" creationId="{A83C95F3-56CE-A8BE-4166-5101A47E4447}"/>
-          </ac:spMkLst>
-        </pc:spChg>
-        <pc:spChg chg="add mod">
-          <ac:chgData name="Yoshiharu Hamaguchi" userId="470e288704938fe9" providerId="LiveId" clId="{C43607F1-232B-44DB-B3B2-14DEC55E9315}" dt="2024-09-25T13:29:00.213" v="6471" actId="20577"/>
-          <ac:spMkLst>
-            <pc:docMk/>
-            <pc:sldMk cId="840589698" sldId="268"/>
-            <ac:spMk id="185" creationId="{130A0482-3284-7713-A99C-40E52448C831}"/>
-          </ac:spMkLst>
-        </pc:spChg>
-        <pc:spChg chg="add del">
-          <ac:chgData name="Yoshiharu Hamaguchi" userId="470e288704938fe9" providerId="LiveId" clId="{C43607F1-232B-44DB-B3B2-14DEC55E9315}" dt="2024-09-25T11:55:17.262" v="5111" actId="22"/>
-          <ac:spMkLst>
-            <pc:docMk/>
-            <pc:sldMk cId="840589698" sldId="268"/>
-            <ac:spMk id="187" creationId="{87941EAC-51C0-CC28-E79E-4F55F2887F3F}"/>
-          </ac:spMkLst>
-        </pc:spChg>
-        <pc:spChg chg="add mod">
-          <ac:chgData name="Yoshiharu Hamaguchi" userId="470e288704938fe9" providerId="LiveId" clId="{C43607F1-232B-44DB-B3B2-14DEC55E9315}" dt="2024-09-25T11:56:06.974" v="5238" actId="20577"/>
-          <ac:spMkLst>
-            <pc:docMk/>
-            <pc:sldMk cId="840589698" sldId="268"/>
-            <ac:spMk id="188" creationId="{11DC7CAE-5817-27B1-97A7-D38E5318A4A0}"/>
-          </ac:spMkLst>
-        </pc:spChg>
-        <pc:grpChg chg="add del mod">
-          <ac:chgData name="Yoshiharu Hamaguchi" userId="470e288704938fe9" providerId="LiveId" clId="{C43607F1-232B-44DB-B3B2-14DEC55E9315}" dt="2024-09-25T10:17:45.403" v="3466"/>
-          <ac:grpSpMkLst>
-            <pc:docMk/>
-            <pc:sldMk cId="840589698" sldId="268"/>
-            <ac:grpSpMk id="12" creationId="{D18CFD05-BBD4-36DD-DA7F-F09469CCC1B5}"/>
-          </ac:grpSpMkLst>
-        </pc:grpChg>
-        <pc:grpChg chg="mod">
-          <ac:chgData name="Yoshiharu Hamaguchi" userId="470e288704938fe9" providerId="LiveId" clId="{C43607F1-232B-44DB-B3B2-14DEC55E9315}" dt="2024-09-25T10:17:44.851" v="3464"/>
-          <ac:grpSpMkLst>
-            <pc:docMk/>
-            <pc:sldMk cId="840589698" sldId="268"/>
-            <ac:grpSpMk id="14" creationId="{A627047E-2A2A-4D8C-231E-9EB8FB591DA6}"/>
-          </ac:grpSpMkLst>
-        </pc:grpChg>
-        <pc:picChg chg="add mod">
-          <ac:chgData name="Yoshiharu Hamaguchi" userId="470e288704938fe9" providerId="LiveId" clId="{C43607F1-232B-44DB-B3B2-14DEC55E9315}" dt="2024-09-25T13:27:50.902" v="6461" actId="27349"/>
-          <ac:picMkLst>
-            <pc:docMk/>
-            <pc:sldMk cId="840589698" sldId="268"/>
-            <ac:picMk id="45" creationId="{59F021CE-0421-4999-5D7E-4689EC7A3063}"/>
-          </ac:picMkLst>
-        </pc:picChg>
-        <pc:inkChg chg="add del">
-          <ac:chgData name="Yoshiharu Hamaguchi" userId="470e288704938fe9" providerId="LiveId" clId="{C43607F1-232B-44DB-B3B2-14DEC55E9315}" dt="2024-09-25T10:16:57.865" v="3451" actId="9405"/>
-          <ac:inkMkLst>
-            <pc:docMk/>
-            <pc:sldMk cId="840589698" sldId="268"/>
-            <ac:inkMk id="6" creationId="{FAE79509-3D4A-0016-37ED-9DFA4CF740B5}"/>
-          </ac:inkMkLst>
-        </pc:inkChg>
-        <pc:inkChg chg="add del">
-          <ac:chgData name="Yoshiharu Hamaguchi" userId="470e288704938fe9" providerId="LiveId" clId="{C43607F1-232B-44DB-B3B2-14DEC55E9315}" dt="2024-09-25T10:16:57.597" v="3450" actId="9405"/>
-          <ac:inkMkLst>
-            <pc:docMk/>
-            <pc:sldMk cId="840589698" sldId="268"/>
-            <ac:inkMk id="7" creationId="{98E353E4-EBA4-9D1B-5CD1-850702D68DDF}"/>
-          </ac:inkMkLst>
-        </pc:inkChg>
-        <pc:inkChg chg="add del">
-          <ac:chgData name="Yoshiharu Hamaguchi" userId="470e288704938fe9" providerId="LiveId" clId="{C43607F1-232B-44DB-B3B2-14DEC55E9315}" dt="2024-09-25T10:17:10.699" v="3455" actId="9405"/>
-          <ac:inkMkLst>
-            <pc:docMk/>
-            <pc:sldMk cId="840589698" sldId="268"/>
-            <ac:inkMk id="8" creationId="{B4F14106-ED05-88B4-EAA5-FEB689F36E46}"/>
-          </ac:inkMkLst>
-        </pc:inkChg>
-        <pc:inkChg chg="add del">
-          <ac:chgData name="Yoshiharu Hamaguchi" userId="470e288704938fe9" providerId="LiveId" clId="{C43607F1-232B-44DB-B3B2-14DEC55E9315}" dt="2024-09-25T10:17:10.294" v="3454" actId="9405"/>
-          <ac:inkMkLst>
-            <pc:docMk/>
-            <pc:sldMk cId="840589698" sldId="268"/>
-            <ac:inkMk id="9" creationId="{639922C2-285F-57E3-FEDB-28FF36A73624}"/>
-          </ac:inkMkLst>
-        </pc:inkChg>
-        <pc:inkChg chg="add del mod">
-          <ac:chgData name="Yoshiharu Hamaguchi" userId="470e288704938fe9" providerId="LiveId" clId="{C43607F1-232B-44DB-B3B2-14DEC55E9315}" dt="2024-09-25T10:17:45.797" v="3467" actId="9405"/>
-          <ac:inkMkLst>
-            <pc:docMk/>
-            <pc:sldMk cId="840589698" sldId="268"/>
-            <ac:inkMk id="10" creationId="{A86EA2E0-B3D3-C193-7730-F1D3FD323FDF}"/>
-          </ac:inkMkLst>
-        </pc:inkChg>
-        <pc:inkChg chg="add del mod">
-          <ac:chgData name="Yoshiharu Hamaguchi" userId="470e288704938fe9" providerId="LiveId" clId="{C43607F1-232B-44DB-B3B2-14DEC55E9315}" dt="2024-09-25T10:17:45.403" v="3466"/>
-          <ac:inkMkLst>
-            <pc:docMk/>
-            <pc:sldMk cId="840589698" sldId="268"/>
-            <ac:inkMk id="11" creationId="{72C41B7C-67A6-DEEE-2985-21572EE01F2E}"/>
-          </ac:inkMkLst>
-        </pc:inkChg>
-        <pc:inkChg chg="add del mod">
-          <ac:chgData name="Yoshiharu Hamaguchi" userId="470e288704938fe9" providerId="LiveId" clId="{C43607F1-232B-44DB-B3B2-14DEC55E9315}" dt="2024-09-25T10:17:44.851" v="3464"/>
-          <ac:inkMkLst>
-            <pc:docMk/>
-            <pc:sldMk cId="840589698" sldId="268"/>
-            <ac:inkMk id="13" creationId="{C4D40D36-0343-45FA-6BF6-4981DF8A865E}"/>
-          </ac:inkMkLst>
-        </pc:inkChg>
-        <pc:inkChg chg="add del">
-          <ac:chgData name="Yoshiharu Hamaguchi" userId="470e288704938fe9" providerId="LiveId" clId="{C43607F1-232B-44DB-B3B2-14DEC55E9315}" dt="2024-09-25T10:18:06.916" v="3469" actId="34122"/>
-          <ac:inkMkLst>
-            <pc:docMk/>
-            <pc:sldMk cId="840589698" sldId="268"/>
-            <ac:inkMk id="15" creationId="{711A4B6F-C1B4-18D2-74EE-5C16BF14D5D2}"/>
-          </ac:inkMkLst>
-        </pc:inkChg>
-        <pc:inkChg chg="add del">
-          <ac:chgData name="Yoshiharu Hamaguchi" userId="470e288704938fe9" providerId="LiveId" clId="{C43607F1-232B-44DB-B3B2-14DEC55E9315}" dt="2024-09-25T10:18:28.771" v="3471" actId="34122"/>
-          <ac:inkMkLst>
-            <pc:docMk/>
-            <pc:sldMk cId="840589698" sldId="268"/>
-            <ac:inkMk id="16" creationId="{07121A24-52BE-CAEB-F368-C5D2ADAD134F}"/>
-          </ac:inkMkLst>
-        </pc:inkChg>
-        <pc:cxnChg chg="add mod">
-          <ac:chgData name="Yoshiharu Hamaguchi" userId="470e288704938fe9" providerId="LiveId" clId="{C43607F1-232B-44DB-B3B2-14DEC55E9315}" dt="2024-09-25T13:28:04.391" v="6462" actId="208"/>
-          <ac:cxnSpMkLst>
-            <pc:docMk/>
-            <pc:sldMk cId="840589698" sldId="268"/>
-            <ac:cxnSpMk id="48" creationId="{69393153-AEE1-5B4A-D68A-93D1FD0AFD62}"/>
-          </ac:cxnSpMkLst>
-        </pc:cxnChg>
-        <pc:cxnChg chg="add mod">
-          <ac:chgData name="Yoshiharu Hamaguchi" userId="470e288704938fe9" providerId="LiveId" clId="{C43607F1-232B-44DB-B3B2-14DEC55E9315}" dt="2024-09-25T11:55:02.095" v="5109" actId="1035"/>
-          <ac:cxnSpMkLst>
-            <pc:docMk/>
-            <pc:sldMk cId="840589698" sldId="268"/>
-            <ac:cxnSpMk id="50" creationId="{CFA5960C-E2FD-D6EE-A74A-8EFFBF3FA20C}"/>
-          </ac:cxnSpMkLst>
-        </pc:cxnChg>
-        <pc:cxnChg chg="add del mod">
-          <ac:chgData name="Yoshiharu Hamaguchi" userId="470e288704938fe9" providerId="LiveId" clId="{C43607F1-232B-44DB-B3B2-14DEC55E9315}" dt="2024-09-25T11:43:35.898" v="4811" actId="478"/>
-          <ac:cxnSpMkLst>
-            <pc:docMk/>
-            <pc:sldMk cId="840589698" sldId="268"/>
-            <ac:cxnSpMk id="55" creationId="{C1E6E371-5C9C-583E-BDC4-4013BC434683}"/>
-          </ac:cxnSpMkLst>
-        </pc:cxnChg>
-        <pc:cxnChg chg="add del mod">
-          <ac:chgData name="Yoshiharu Hamaguchi" userId="470e288704938fe9" providerId="LiveId" clId="{C43607F1-232B-44DB-B3B2-14DEC55E9315}" dt="2024-09-25T11:43:33.654" v="4810" actId="478"/>
-          <ac:cxnSpMkLst>
-            <pc:docMk/>
-            <pc:sldMk cId="840589698" sldId="268"/>
-            <ac:cxnSpMk id="58" creationId="{E3C02521-E9EC-676D-ACB2-046D85CADDFF}"/>
-          </ac:cxnSpMkLst>
-        </pc:cxnChg>
-        <pc:cxnChg chg="add mod">
-          <ac:chgData name="Yoshiharu Hamaguchi" userId="470e288704938fe9" providerId="LiveId" clId="{C43607F1-232B-44DB-B3B2-14DEC55E9315}" dt="2024-09-25T11:55:02.095" v="5109" actId="1035"/>
-          <ac:cxnSpMkLst>
-            <pc:docMk/>
-            <pc:sldMk cId="840589698" sldId="268"/>
-            <ac:cxnSpMk id="61" creationId="{97380F3F-B4EC-2F06-9E3A-119161B80E1D}"/>
-          </ac:cxnSpMkLst>
-        </pc:cxnChg>
-        <pc:cxnChg chg="add mod">
-          <ac:chgData name="Yoshiharu Hamaguchi" userId="470e288704938fe9" providerId="LiveId" clId="{C43607F1-232B-44DB-B3B2-14DEC55E9315}" dt="2024-09-25T11:55:02.095" v="5109" actId="1035"/>
-          <ac:cxnSpMkLst>
-            <pc:docMk/>
-            <pc:sldMk cId="840589698" sldId="268"/>
-            <ac:cxnSpMk id="64" creationId="{7A976978-6192-9393-1108-B2E4A3E176A2}"/>
-          </ac:cxnSpMkLst>
-        </pc:cxnChg>
-        <pc:cxnChg chg="add del mod ord">
-          <ac:chgData name="Yoshiharu Hamaguchi" userId="470e288704938fe9" providerId="LiveId" clId="{C43607F1-232B-44DB-B3B2-14DEC55E9315}" dt="2024-09-25T11:55:02.095" v="5109" actId="1035"/>
-          <ac:cxnSpMkLst>
-            <pc:docMk/>
-            <pc:sldMk cId="840589698" sldId="268"/>
-            <ac:cxnSpMk id="67" creationId="{E4B332FF-DA63-222D-60B0-8C1AFCA0A5CC}"/>
-          </ac:cxnSpMkLst>
-        </pc:cxnChg>
-        <pc:cxnChg chg="add del mod">
-          <ac:chgData name="Yoshiharu Hamaguchi" userId="470e288704938fe9" providerId="LiveId" clId="{C43607F1-232B-44DB-B3B2-14DEC55E9315}" dt="2024-09-25T11:42:51.712" v="4787" actId="478"/>
-          <ac:cxnSpMkLst>
-            <pc:docMk/>
-            <pc:sldMk cId="840589698" sldId="268"/>
-            <ac:cxnSpMk id="82" creationId="{CB0EA28D-6B41-BA92-5477-F870C9BF05C8}"/>
-          </ac:cxnSpMkLst>
-        </pc:cxnChg>
-        <pc:cxnChg chg="add mod">
-          <ac:chgData name="Yoshiharu Hamaguchi" userId="470e288704938fe9" providerId="LiveId" clId="{C43607F1-232B-44DB-B3B2-14DEC55E9315}" dt="2024-09-25T11:55:02.095" v="5109" actId="1035"/>
-          <ac:cxnSpMkLst>
-            <pc:docMk/>
-            <pc:sldMk cId="840589698" sldId="268"/>
-            <ac:cxnSpMk id="85" creationId="{5521CAAD-A1E8-0103-75E1-A6496D12E07F}"/>
-          </ac:cxnSpMkLst>
-        </pc:cxnChg>
-        <pc:cxnChg chg="add mod">
-          <ac:chgData name="Yoshiharu Hamaguchi" userId="470e288704938fe9" providerId="LiveId" clId="{C43607F1-232B-44DB-B3B2-14DEC55E9315}" dt="2024-09-25T11:55:02.095" v="5109" actId="1035"/>
-          <ac:cxnSpMkLst>
-            <pc:docMk/>
-            <pc:sldMk cId="840589698" sldId="268"/>
-            <ac:cxnSpMk id="88" creationId="{4B306A65-14F2-3593-3D31-60757CB57107}"/>
-          </ac:cxnSpMkLst>
-        </pc:cxnChg>
-        <pc:cxnChg chg="add del mod">
-          <ac:chgData name="Yoshiharu Hamaguchi" userId="470e288704938fe9" providerId="LiveId" clId="{C43607F1-232B-44DB-B3B2-14DEC55E9315}" dt="2024-09-25T11:45:01.527" v="4859" actId="478"/>
-          <ac:cxnSpMkLst>
-            <pc:docMk/>
-            <pc:sldMk cId="840589698" sldId="268"/>
-            <ac:cxnSpMk id="91" creationId="{00310F9F-3183-EBDA-F940-FACA4B25E9D1}"/>
-          </ac:cxnSpMkLst>
-        </pc:cxnChg>
-        <pc:cxnChg chg="add del mod">
-          <ac:chgData name="Yoshiharu Hamaguchi" userId="470e288704938fe9" providerId="LiveId" clId="{C43607F1-232B-44DB-B3B2-14DEC55E9315}" dt="2024-09-25T11:55:02.095" v="5109" actId="1035"/>
-          <ac:cxnSpMkLst>
-            <pc:docMk/>
-            <pc:sldMk cId="840589698" sldId="268"/>
-            <ac:cxnSpMk id="124" creationId="{D3A0DDA0-90A1-7E9A-338D-464A0AB369B6}"/>
-          </ac:cxnSpMkLst>
-        </pc:cxnChg>
-        <pc:cxnChg chg="add mod">
-          <ac:chgData name="Yoshiharu Hamaguchi" userId="470e288704938fe9" providerId="LiveId" clId="{C43607F1-232B-44DB-B3B2-14DEC55E9315}" dt="2024-09-25T11:55:02.095" v="5109" actId="1035"/>
-          <ac:cxnSpMkLst>
-            <pc:docMk/>
-            <pc:sldMk cId="840589698" sldId="268"/>
-            <ac:cxnSpMk id="127" creationId="{9EC78F66-EF39-54B3-AB98-E84927268771}"/>
-          </ac:cxnSpMkLst>
-        </pc:cxnChg>
-        <pc:cxnChg chg="add mod">
-          <ac:chgData name="Yoshiharu Hamaguchi" userId="470e288704938fe9" providerId="LiveId" clId="{C43607F1-232B-44DB-B3B2-14DEC55E9315}" dt="2024-09-25T11:55:02.095" v="5109" actId="1035"/>
-          <ac:cxnSpMkLst>
-            <pc:docMk/>
-            <pc:sldMk cId="840589698" sldId="268"/>
-            <ac:cxnSpMk id="170" creationId="{04B8B0AB-0A41-F5D9-4C41-10446EE21735}"/>
-          </ac:cxnSpMkLst>
-        </pc:cxnChg>
-        <pc:cxnChg chg="add mod">
-          <ac:chgData name="Yoshiharu Hamaguchi" userId="470e288704938fe9" providerId="LiveId" clId="{C43607F1-232B-44DB-B3B2-14DEC55E9315}" dt="2024-09-25T11:55:02.095" v="5109" actId="1035"/>
-          <ac:cxnSpMkLst>
-            <pc:docMk/>
-            <pc:sldMk cId="840589698" sldId="268"/>
-            <ac:cxnSpMk id="175" creationId="{152005CE-C530-4496-5760-AA3F6AA1AEE2}"/>
-          </ac:cxnSpMkLst>
-        </pc:cxnChg>
-        <pc:cxnChg chg="add mod">
-          <ac:chgData name="Yoshiharu Hamaguchi" userId="470e288704938fe9" providerId="LiveId" clId="{C43607F1-232B-44DB-B3B2-14DEC55E9315}" dt="2024-09-25T13:28:04.391" v="6462" actId="208"/>
-          <ac:cxnSpMkLst>
-            <pc:docMk/>
-            <pc:sldMk cId="840589698" sldId="268"/>
-            <ac:cxnSpMk id="179" creationId="{7A4A3A67-DD95-558D-CEE2-3908D3A834BF}"/>
-          </ac:cxnSpMkLst>
-        </pc:cxnChg>
-        <pc:cxnChg chg="add mod">
-          <ac:chgData name="Yoshiharu Hamaguchi" userId="470e288704938fe9" providerId="LiveId" clId="{C43607F1-232B-44DB-B3B2-14DEC55E9315}" dt="2024-09-25T13:28:04.391" v="6462" actId="208"/>
-          <ac:cxnSpMkLst>
-            <pc:docMk/>
-            <pc:sldMk cId="840589698" sldId="268"/>
-            <ac:cxnSpMk id="182" creationId="{82CC0E9E-8ADB-EC6E-7027-6781BBB288FA}"/>
-          </ac:cxnSpMkLst>
-        </pc:cxnChg>
-      </pc:sldChg>
-      <pc:sldChg chg="addSp delSp modSp add del mod">
-        <pc:chgData name="Yoshiharu Hamaguchi" userId="470e288704938fe9" providerId="LiveId" clId="{C43607F1-232B-44DB-B3B2-14DEC55E9315}" dt="2024-09-25T15:43:33.374" v="6823" actId="47"/>
-        <pc:sldMkLst>
-          <pc:docMk/>
-          <pc:sldMk cId="2142688305" sldId="269"/>
-        </pc:sldMkLst>
-        <pc:spChg chg="mod">
-          <ac:chgData name="Yoshiharu Hamaguchi" userId="470e288704938fe9" providerId="LiveId" clId="{C43607F1-232B-44DB-B3B2-14DEC55E9315}" dt="2024-09-25T15:24:31.506" v="6651" actId="14100"/>
-          <ac:spMkLst>
-            <pc:docMk/>
-            <pc:sldMk cId="2142688305" sldId="269"/>
-            <ac:spMk id="2" creationId="{9C784ACA-9376-15C6-DD93-68B5D582FADA}"/>
-          </ac:spMkLst>
-        </pc:spChg>
-        <pc:spChg chg="mod">
-          <ac:chgData name="Yoshiharu Hamaguchi" userId="470e288704938fe9" providerId="LiveId" clId="{C43607F1-232B-44DB-B3B2-14DEC55E9315}" dt="2024-09-25T15:27:25.266" v="6758" actId="20577"/>
-          <ac:spMkLst>
-            <pc:docMk/>
-            <pc:sldMk cId="2142688305" sldId="269"/>
-            <ac:spMk id="4" creationId="{8C13C9CE-666C-02A7-9EAA-106F1B50AE66}"/>
-          </ac:spMkLst>
-        </pc:spChg>
-        <pc:spChg chg="del">
-          <ac:chgData name="Yoshiharu Hamaguchi" userId="470e288704938fe9" providerId="LiveId" clId="{C43607F1-232B-44DB-B3B2-14DEC55E9315}" dt="2024-09-25T15:24:43.991" v="6652" actId="478"/>
-          <ac:spMkLst>
-            <pc:docMk/>
-            <pc:sldMk cId="2142688305" sldId="269"/>
-            <ac:spMk id="5" creationId="{38525753-506C-CF9E-DF2A-0368D654E503}"/>
-          </ac:spMkLst>
-        </pc:spChg>
-        <pc:picChg chg="add mod">
-          <ac:chgData name="Yoshiharu Hamaguchi" userId="470e288704938fe9" providerId="LiveId" clId="{C43607F1-232B-44DB-B3B2-14DEC55E9315}" dt="2024-09-25T15:27:23.110" v="6757" actId="1076"/>
-          <ac:picMkLst>
-            <pc:docMk/>
-            <pc:sldMk cId="2142688305" sldId="269"/>
-            <ac:picMk id="6" creationId="{48B13ABD-A7EC-8A70-7FC9-8BE6883BF949}"/>
-          </ac:picMkLst>
-        </pc:picChg>
-      </pc:sldChg>
-      <pc:sldChg chg="modSp add mod">
-        <pc:chgData name="Yoshiharu Hamaguchi" userId="470e288704938fe9" providerId="LiveId" clId="{C43607F1-232B-44DB-B3B2-14DEC55E9315}" dt="2024-09-25T15:42:37.074" v="6816" actId="20577"/>
-        <pc:sldMkLst>
-          <pc:docMk/>
-          <pc:sldMk cId="1811470058" sldId="270"/>
-        </pc:sldMkLst>
-        <pc:spChg chg="mod">
-          <ac:chgData name="Yoshiharu Hamaguchi" userId="470e288704938fe9" providerId="LiveId" clId="{C43607F1-232B-44DB-B3B2-14DEC55E9315}" dt="2024-09-25T15:42:37.074" v="6816" actId="20577"/>
-          <ac:spMkLst>
-            <pc:docMk/>
-            <pc:sldMk cId="1811470058" sldId="270"/>
-            <ac:spMk id="24" creationId="{2C710E95-554D-F235-C3F1-BF13E1AA1068}"/>
-          </ac:spMkLst>
-        </pc:spChg>
-      </pc:sldChg>
-    </pc:docChg>
-  </pc:docChgLst>
 </pc:chgInfo>
 </file>
 
@@ -1279,7 +1279,7 @@
           <a:p>
             <a:fld id="{9627246E-3903-4E01-B28D-BFF5567D65C3}" type="datetimeFigureOut">
               <a:rPr kumimoji="1" lang="ja-JP" altLang="en-US" smtClean="0"/>
-              <a:t>2024/9/26</a:t>
+              <a:t>2024/9/29</a:t>
             </a:fld>
             <a:endParaRPr kumimoji="1" lang="ja-JP" altLang="en-US"/>
           </a:p>
@@ -1509,7 +1509,7 @@
           <a:p>
             <a:fld id="{9627246E-3903-4E01-B28D-BFF5567D65C3}" type="datetimeFigureOut">
               <a:rPr kumimoji="1" lang="ja-JP" altLang="en-US" smtClean="0"/>
-              <a:t>2024/9/26</a:t>
+              <a:t>2024/9/29</a:t>
             </a:fld>
             <a:endParaRPr kumimoji="1" lang="ja-JP" altLang="en-US"/>
           </a:p>
@@ -1749,7 +1749,7 @@
           <a:p>
             <a:fld id="{9627246E-3903-4E01-B28D-BFF5567D65C3}" type="datetimeFigureOut">
               <a:rPr kumimoji="1" lang="ja-JP" altLang="en-US" smtClean="0"/>
-              <a:t>2024/9/26</a:t>
+              <a:t>2024/9/29</a:t>
             </a:fld>
             <a:endParaRPr kumimoji="1" lang="ja-JP" altLang="en-US"/>
           </a:p>
@@ -1979,7 +1979,7 @@
           <a:p>
             <a:fld id="{9627246E-3903-4E01-B28D-BFF5567D65C3}" type="datetimeFigureOut">
               <a:rPr kumimoji="1" lang="ja-JP" altLang="en-US" smtClean="0"/>
-              <a:t>2024/9/26</a:t>
+              <a:t>2024/9/29</a:t>
             </a:fld>
             <a:endParaRPr kumimoji="1" lang="ja-JP" altLang="en-US"/>
           </a:p>
@@ -2254,7 +2254,7 @@
           <a:p>
             <a:fld id="{9627246E-3903-4E01-B28D-BFF5567D65C3}" type="datetimeFigureOut">
               <a:rPr kumimoji="1" lang="ja-JP" altLang="en-US" smtClean="0"/>
-              <a:t>2024/9/26</a:t>
+              <a:t>2024/9/29</a:t>
             </a:fld>
             <a:endParaRPr kumimoji="1" lang="ja-JP" altLang="en-US"/>
           </a:p>
@@ -2583,7 +2583,7 @@
           <a:p>
             <a:fld id="{9627246E-3903-4E01-B28D-BFF5567D65C3}" type="datetimeFigureOut">
               <a:rPr kumimoji="1" lang="ja-JP" altLang="en-US" smtClean="0"/>
-              <a:t>2024/9/26</a:t>
+              <a:t>2024/9/29</a:t>
             </a:fld>
             <a:endParaRPr kumimoji="1" lang="ja-JP" altLang="en-US"/>
           </a:p>
@@ -3059,7 +3059,7 @@
           <a:p>
             <a:fld id="{9627246E-3903-4E01-B28D-BFF5567D65C3}" type="datetimeFigureOut">
               <a:rPr kumimoji="1" lang="ja-JP" altLang="en-US" smtClean="0"/>
-              <a:t>2024/9/26</a:t>
+              <a:t>2024/9/29</a:t>
             </a:fld>
             <a:endParaRPr kumimoji="1" lang="ja-JP" altLang="en-US"/>
           </a:p>
@@ -3200,7 +3200,7 @@
           <a:p>
             <a:fld id="{9627246E-3903-4E01-B28D-BFF5567D65C3}" type="datetimeFigureOut">
               <a:rPr kumimoji="1" lang="ja-JP" altLang="en-US" smtClean="0"/>
-              <a:t>2024/9/26</a:t>
+              <a:t>2024/9/29</a:t>
             </a:fld>
             <a:endParaRPr kumimoji="1" lang="ja-JP" altLang="en-US"/>
           </a:p>
@@ -3313,7 +3313,7 @@
           <a:p>
             <a:fld id="{9627246E-3903-4E01-B28D-BFF5567D65C3}" type="datetimeFigureOut">
               <a:rPr kumimoji="1" lang="ja-JP" altLang="en-US" smtClean="0"/>
-              <a:t>2024/9/26</a:t>
+              <a:t>2024/9/29</a:t>
             </a:fld>
             <a:endParaRPr kumimoji="1" lang="ja-JP" altLang="en-US"/>
           </a:p>
@@ -3656,7 +3656,7 @@
           <a:p>
             <a:fld id="{9627246E-3903-4E01-B28D-BFF5567D65C3}" type="datetimeFigureOut">
               <a:rPr kumimoji="1" lang="ja-JP" altLang="en-US" smtClean="0"/>
-              <a:t>2024/9/26</a:t>
+              <a:t>2024/9/29</a:t>
             </a:fld>
             <a:endParaRPr kumimoji="1" lang="ja-JP" altLang="en-US"/>
           </a:p>
@@ -3944,7 +3944,7 @@
           <a:p>
             <a:fld id="{9627246E-3903-4E01-B28D-BFF5567D65C3}" type="datetimeFigureOut">
               <a:rPr kumimoji="1" lang="ja-JP" altLang="en-US" smtClean="0"/>
-              <a:t>2024/9/26</a:t>
+              <a:t>2024/9/29</a:t>
             </a:fld>
             <a:endParaRPr kumimoji="1" lang="ja-JP" altLang="en-US"/>
           </a:p>
@@ -4217,7 +4217,7 @@
           <a:p>
             <a:fld id="{9627246E-3903-4E01-B28D-BFF5567D65C3}" type="datetimeFigureOut">
               <a:rPr kumimoji="1" lang="ja-JP" altLang="en-US" smtClean="0"/>
-              <a:t>2024/9/26</a:t>
+              <a:t>2024/9/29</a:t>
             </a:fld>
             <a:endParaRPr kumimoji="1" lang="ja-JP" altLang="en-US"/>
           </a:p>

</xml_diff>